<commit_message>
Add diagrams to presentation
</commit_message>
<xml_diff>
--- a/rezervito-hw-05/Rezervito_Presentation_62121_62151_62167.pptx
+++ b/rezervito-hw-05/Rezervito_Presentation_62121_62151_62167.pptx
@@ -5,7 +5,7 @@
     <p:sldMasterId id="2147483803" r:id="rId1"/>
   </p:sldMasterIdLst>
   <p:notesMasterIdLst>
-    <p:notesMasterId r:id="rId18"/>
+    <p:notesMasterId r:id="rId27"/>
   </p:notesMasterIdLst>
   <p:sldIdLst>
     <p:sldId id="256" r:id="rId2"/>
@@ -18,12 +18,21 @@
     <p:sldId id="259" r:id="rId9"/>
     <p:sldId id="279" r:id="rId10"/>
     <p:sldId id="268" r:id="rId11"/>
-    <p:sldId id="269" r:id="rId12"/>
-    <p:sldId id="270" r:id="rId13"/>
-    <p:sldId id="277" r:id="rId14"/>
-    <p:sldId id="278" r:id="rId15"/>
-    <p:sldId id="276" r:id="rId16"/>
-    <p:sldId id="275" r:id="rId17"/>
+    <p:sldId id="287" r:id="rId12"/>
+    <p:sldId id="288" r:id="rId13"/>
+    <p:sldId id="289" r:id="rId14"/>
+    <p:sldId id="269" r:id="rId15"/>
+    <p:sldId id="281" r:id="rId16"/>
+    <p:sldId id="282" r:id="rId17"/>
+    <p:sldId id="270" r:id="rId18"/>
+    <p:sldId id="284" r:id="rId19"/>
+    <p:sldId id="285" r:id="rId20"/>
+    <p:sldId id="286" r:id="rId21"/>
+    <p:sldId id="277" r:id="rId22"/>
+    <p:sldId id="283" r:id="rId23"/>
+    <p:sldId id="278" r:id="rId24"/>
+    <p:sldId id="276" r:id="rId25"/>
+    <p:sldId id="275" r:id="rId26"/>
   </p:sldIdLst>
   <p:sldSz cx="9144000" cy="6858000" type="screen4x3"/>
   <p:notesSz cx="6858000" cy="9144000"/>
@@ -7086,7 +7095,12 @@
             <p:ph type="title"/>
           </p:nvPr>
         </p:nvSpPr>
-        <p:spPr/>
+        <p:spPr>
+          <a:xfrm>
+            <a:off x="251520" y="155575"/>
+            <a:ext cx="7632848" cy="1185193"/>
+          </a:xfrm>
+        </p:spPr>
         <p:txBody>
           <a:bodyPr>
             <a:noAutofit/>
@@ -7121,59 +7135,44 @@
           </a:p>
         </p:txBody>
       </p:sp>
-      <p:sp>
-        <p:nvSpPr>
-          <p:cNvPr id="22530" name="Content Placeholder 2"/>
-          <p:cNvSpPr>
-            <a:spLocks noGrp="1"/>
-          </p:cNvSpPr>
+      <p:pic>
+        <p:nvPicPr>
+          <p:cNvPr id="7" name="Content Placeholder 6">
+            <a:extLst>
+              <a:ext uri="{FF2B5EF4-FFF2-40B4-BE49-F238E27FC236}">
+                <a16:creationId xmlns:a16="http://schemas.microsoft.com/office/drawing/2014/main" id="{85C2E4D8-E11F-4F3F-B326-0136C4F09D2D}"/>
+              </a:ext>
+            </a:extLst>
+          </p:cNvPr>
+          <p:cNvPicPr>
+            <a:picLocks noGrp="1"/>
+          </p:cNvPicPr>
           <p:nvPr>
             <p:ph idx="1"/>
           </p:nvPr>
-        </p:nvSpPr>
-        <p:spPr/>
-        <p:txBody>
-          <a:bodyPr/>
-          <a:lstStyle/>
-          <a:p>
-            <a:pPr eaLnBrk="1" hangingPunct="1"/>
-            <a:endParaRPr lang="bg-BG"/>
-          </a:p>
-        </p:txBody>
-      </p:sp>
-      <p:sp>
-        <p:nvSpPr>
-          <p:cNvPr id="6" name="Slide Number Placeholder 5"/>
-          <p:cNvSpPr>
-            <a:spLocks noGrp="1"/>
-          </p:cNvSpPr>
-          <p:nvPr>
-            <p:ph type="sldNum" sz="quarter" idx="12"/>
-          </p:nvPr>
-        </p:nvSpPr>
-        <p:spPr/>
-        <p:txBody>
-          <a:bodyPr/>
-          <a:lstStyle/>
-          <a:p>
-            <a:pPr>
-              <a:defRPr/>
-            </a:pPr>
-            <a:fld id="{FDEDBE27-2B47-48C0-AF39-C9DE9AC62D61}" type="slidenum">
-              <a:rPr lang="en-US"/>
-              <a:pPr>
-                <a:defRPr/>
-              </a:pPr>
-              <a:t>10</a:t>
-            </a:fld>
-            <a:endParaRPr lang="en-US" dirty="0">
-              <a:solidFill>
-                <a:srgbClr val="FFFFFF"/>
-              </a:solidFill>
-            </a:endParaRPr>
-          </a:p>
-        </p:txBody>
-      </p:sp>
+        </p:nvPicPr>
+        <p:blipFill>
+          <a:blip r:embed="rId2">
+            <a:extLst>
+              <a:ext uri="{28A0092B-C50C-407E-A947-70E740481C1C}">
+                <a14:useLocalDpi xmlns:a14="http://schemas.microsoft.com/office/drawing/2010/main" val="0"/>
+              </a:ext>
+            </a:extLst>
+          </a:blip>
+          <a:stretch>
+            <a:fillRect/>
+          </a:stretch>
+        </p:blipFill>
+        <p:spPr>
+          <a:xfrm>
+            <a:off x="755576" y="980728"/>
+            <a:ext cx="5766145" cy="5578400"/>
+          </a:xfrm>
+          <a:prstGeom prst="rect">
+            <a:avLst/>
+          </a:prstGeom>
+        </p:spPr>
+      </p:pic>
     </p:spTree>
   </p:cSld>
   <p:clrMapOvr>
@@ -7199,105 +7198,46 @@
           <a:chExt cx="0" cy="0"/>
         </a:xfrm>
       </p:grpSpPr>
-      <p:sp>
-        <p:nvSpPr>
-          <p:cNvPr id="2" name="Title 1"/>
-          <p:cNvSpPr>
-            <a:spLocks noGrp="1"/>
-          </p:cNvSpPr>
-          <p:nvPr>
-            <p:ph type="title"/>
-          </p:nvPr>
-        </p:nvSpPr>
-        <p:spPr/>
-        <p:txBody>
-          <a:bodyPr>
-            <a:normAutofit/>
-          </a:bodyPr>
-          <a:lstStyle/>
-          <a:p>
-            <a:pPr eaLnBrk="1" fontAlgn="auto" hangingPunct="1">
-              <a:spcAft>
-                <a:spcPts val="0"/>
-              </a:spcAft>
-              <a:defRPr/>
-            </a:pPr>
-            <a:r>
-              <a:rPr lang="bg-BG" dirty="0">
-                <a:solidFill>
-                  <a:schemeClr val="accent1">
-                    <a:tint val="88000"/>
-                    <a:satMod val="150000"/>
-                  </a:schemeClr>
-                </a:solidFill>
-              </a:rPr>
-              <a:t>Основни диаграми на последователност</a:t>
-            </a:r>
-            <a:endParaRPr lang="en-US" dirty="0">
-              <a:solidFill>
-                <a:schemeClr val="accent1">
-                  <a:tint val="88000"/>
-                  <a:satMod val="150000"/>
-                </a:schemeClr>
-              </a:solidFill>
-            </a:endParaRPr>
-          </a:p>
-        </p:txBody>
-      </p:sp>
-      <p:sp>
-        <p:nvSpPr>
-          <p:cNvPr id="23554" name="Content Placeholder 2"/>
-          <p:cNvSpPr>
-            <a:spLocks noGrp="1"/>
-          </p:cNvSpPr>
-          <p:nvPr>
-            <p:ph idx="1"/>
-          </p:nvPr>
-        </p:nvSpPr>
-        <p:spPr/>
-        <p:txBody>
-          <a:bodyPr/>
-          <a:lstStyle/>
-          <a:p>
-            <a:pPr eaLnBrk="1" hangingPunct="1"/>
-            <a:endParaRPr lang="bg-BG"/>
-          </a:p>
-        </p:txBody>
-      </p:sp>
-      <p:sp>
-        <p:nvSpPr>
-          <p:cNvPr id="6" name="Slide Number Placeholder 5"/>
-          <p:cNvSpPr>
-            <a:spLocks noGrp="1"/>
-          </p:cNvSpPr>
-          <p:nvPr>
-            <p:ph type="sldNum" sz="quarter" idx="12"/>
-          </p:nvPr>
-        </p:nvSpPr>
-        <p:spPr/>
-        <p:txBody>
-          <a:bodyPr/>
-          <a:lstStyle/>
-          <a:p>
-            <a:pPr>
-              <a:defRPr/>
-            </a:pPr>
-            <a:fld id="{232B5B2A-446D-4A02-A5C1-1AE2E988FA38}" type="slidenum">
-              <a:rPr lang="en-US"/>
-              <a:pPr>
-                <a:defRPr/>
-              </a:pPr>
-              <a:t>11</a:t>
-            </a:fld>
-            <a:endParaRPr lang="en-US" dirty="0">
-              <a:solidFill>
-                <a:srgbClr val="FFFFFF"/>
-              </a:solidFill>
-            </a:endParaRPr>
-          </a:p>
-        </p:txBody>
-      </p:sp>
+      <p:pic>
+        <p:nvPicPr>
+          <p:cNvPr id="7" name="Picture 6">
+            <a:extLst>
+              <a:ext uri="{FF2B5EF4-FFF2-40B4-BE49-F238E27FC236}">
+                <a16:creationId xmlns:a16="http://schemas.microsoft.com/office/drawing/2014/main" id="{3086A8DA-F814-4FF5-A35C-A989C64BE45C}"/>
+              </a:ext>
+            </a:extLst>
+          </p:cNvPr>
+          <p:cNvPicPr/>
+          <p:nvPr/>
+        </p:nvPicPr>
+        <p:blipFill>
+          <a:blip r:embed="rId2">
+            <a:extLst>
+              <a:ext uri="{28A0092B-C50C-407E-A947-70E740481C1C}">
+                <a14:useLocalDpi xmlns:a14="http://schemas.microsoft.com/office/drawing/2010/main" val="0"/>
+              </a:ext>
+            </a:extLst>
+          </a:blip>
+          <a:stretch>
+            <a:fillRect/>
+          </a:stretch>
+        </p:blipFill>
+        <p:spPr>
+          <a:xfrm>
+            <a:off x="-13712" y="404664"/>
+            <a:ext cx="8424936" cy="6204376"/>
+          </a:xfrm>
+          <a:prstGeom prst="rect">
+            <a:avLst/>
+          </a:prstGeom>
+        </p:spPr>
+      </p:pic>
     </p:spTree>
+    <p:extLst>
+      <p:ext uri="{BB962C8B-B14F-4D97-AF65-F5344CB8AC3E}">
+        <p14:creationId xmlns:p14="http://schemas.microsoft.com/office/powerpoint/2010/main" val="4015298976"/>
+      </p:ext>
+    </p:extLst>
   </p:cSld>
   <p:clrMapOvr>
     <a:masterClrMapping/>
@@ -7322,105 +7262,46 @@
           <a:chExt cx="0" cy="0"/>
         </a:xfrm>
       </p:grpSpPr>
-      <p:sp>
-        <p:nvSpPr>
-          <p:cNvPr id="2" name="Title 1"/>
-          <p:cNvSpPr>
-            <a:spLocks noGrp="1"/>
-          </p:cNvSpPr>
-          <p:nvPr>
-            <p:ph type="title"/>
-          </p:nvPr>
-        </p:nvSpPr>
-        <p:spPr/>
-        <p:txBody>
-          <a:bodyPr>
-            <a:normAutofit/>
-          </a:bodyPr>
-          <a:lstStyle/>
-          <a:p>
-            <a:pPr eaLnBrk="1" fontAlgn="auto" hangingPunct="1">
-              <a:spcAft>
-                <a:spcPts val="0"/>
-              </a:spcAft>
-              <a:defRPr/>
-            </a:pPr>
-            <a:r>
-              <a:rPr lang="bg-BG" dirty="0">
-                <a:solidFill>
-                  <a:schemeClr val="accent1">
-                    <a:tint val="88000"/>
-                    <a:satMod val="150000"/>
-                  </a:schemeClr>
-                </a:solidFill>
-              </a:rPr>
-              <a:t>Основни диаграми на активностите</a:t>
-            </a:r>
-            <a:endParaRPr lang="en-US" dirty="0">
-              <a:solidFill>
-                <a:schemeClr val="accent1">
-                  <a:tint val="88000"/>
-                  <a:satMod val="150000"/>
-                </a:schemeClr>
-              </a:solidFill>
-            </a:endParaRPr>
-          </a:p>
-        </p:txBody>
-      </p:sp>
-      <p:sp>
-        <p:nvSpPr>
-          <p:cNvPr id="24578" name="Content Placeholder 2"/>
-          <p:cNvSpPr>
-            <a:spLocks noGrp="1"/>
-          </p:cNvSpPr>
-          <p:nvPr>
-            <p:ph idx="1"/>
-          </p:nvPr>
-        </p:nvSpPr>
-        <p:spPr/>
-        <p:txBody>
-          <a:bodyPr/>
-          <a:lstStyle/>
-          <a:p>
-            <a:pPr eaLnBrk="1" hangingPunct="1"/>
-            <a:endParaRPr lang="bg-BG"/>
-          </a:p>
-        </p:txBody>
-      </p:sp>
-      <p:sp>
-        <p:nvSpPr>
-          <p:cNvPr id="6" name="Slide Number Placeholder 5"/>
-          <p:cNvSpPr>
-            <a:spLocks noGrp="1"/>
-          </p:cNvSpPr>
-          <p:nvPr>
-            <p:ph type="sldNum" sz="quarter" idx="12"/>
-          </p:nvPr>
-        </p:nvSpPr>
-        <p:spPr/>
-        <p:txBody>
-          <a:bodyPr/>
-          <a:lstStyle/>
-          <a:p>
-            <a:pPr>
-              <a:defRPr/>
-            </a:pPr>
-            <a:fld id="{AC7B0B58-7DAC-46BA-B71D-2FEC6484DF4B}" type="slidenum">
-              <a:rPr lang="en-US"/>
-              <a:pPr>
-                <a:defRPr/>
-              </a:pPr>
-              <a:t>12</a:t>
-            </a:fld>
-            <a:endParaRPr lang="en-US" dirty="0">
-              <a:solidFill>
-                <a:srgbClr val="FFFFFF"/>
-              </a:solidFill>
-            </a:endParaRPr>
-          </a:p>
-        </p:txBody>
-      </p:sp>
+      <p:pic>
+        <p:nvPicPr>
+          <p:cNvPr id="7" name="Picture 6">
+            <a:extLst>
+              <a:ext uri="{FF2B5EF4-FFF2-40B4-BE49-F238E27FC236}">
+                <a16:creationId xmlns:a16="http://schemas.microsoft.com/office/drawing/2014/main" id="{0C35E20D-2F46-40CF-A8C7-C4C795CC0FE8}"/>
+              </a:ext>
+            </a:extLst>
+          </p:cNvPr>
+          <p:cNvPicPr/>
+          <p:nvPr/>
+        </p:nvPicPr>
+        <p:blipFill>
+          <a:blip r:embed="rId2">
+            <a:extLst>
+              <a:ext uri="{28A0092B-C50C-407E-A947-70E740481C1C}">
+                <a14:useLocalDpi xmlns:a14="http://schemas.microsoft.com/office/drawing/2010/main" val="0"/>
+              </a:ext>
+            </a:extLst>
+          </a:blip>
+          <a:stretch>
+            <a:fillRect/>
+          </a:stretch>
+        </p:blipFill>
+        <p:spPr>
+          <a:xfrm>
+            <a:off x="107504" y="368660"/>
+            <a:ext cx="6912768" cy="6120680"/>
+          </a:xfrm>
+          <a:prstGeom prst="rect">
+            <a:avLst/>
+          </a:prstGeom>
+        </p:spPr>
+      </p:pic>
     </p:spTree>
+    <p:extLst>
+      <p:ext uri="{BB962C8B-B14F-4D97-AF65-F5344CB8AC3E}">
+        <p14:creationId xmlns:p14="http://schemas.microsoft.com/office/powerpoint/2010/main" val="1632241537"/>
+      </p:ext>
+    </p:extLst>
   </p:cSld>
   <p:clrMapOvr>
     <a:masterClrMapping/>
@@ -7445,151 +7326,44 @@
           <a:chExt cx="0" cy="0"/>
         </a:xfrm>
       </p:grpSpPr>
-      <p:sp>
-        <p:nvSpPr>
-          <p:cNvPr id="2" name="Title 1">
+      <p:pic>
+        <p:nvPicPr>
+          <p:cNvPr id="7" name="Picture 6">
             <a:extLst>
               <a:ext uri="{FF2B5EF4-FFF2-40B4-BE49-F238E27FC236}">
-                <a16:creationId xmlns:a16="http://schemas.microsoft.com/office/drawing/2014/main" id="{81A6B9A3-81A3-447A-AAEC-56E0730E41EB}"/>
+                <a16:creationId xmlns:a16="http://schemas.microsoft.com/office/drawing/2014/main" id="{2B1BFA99-1E45-48FD-BE57-DE357B2B7E1A}"/>
               </a:ext>
             </a:extLst>
           </p:cNvPr>
-          <p:cNvSpPr>
-            <a:spLocks noGrp="1"/>
-          </p:cNvSpPr>
-          <p:nvPr>
-            <p:ph type="title"/>
-          </p:nvPr>
-        </p:nvSpPr>
-        <p:spPr/>
-        <p:txBody>
-          <a:bodyPr>
-            <a:normAutofit/>
-          </a:bodyPr>
-          <a:lstStyle/>
-          <a:p>
-            <a:r>
-              <a:rPr lang="bg-BG" dirty="0">
-                <a:solidFill>
-                  <a:schemeClr val="accent1">
-                    <a:tint val="88000"/>
-                    <a:satMod val="150000"/>
-                  </a:schemeClr>
-                </a:solidFill>
-              </a:rPr>
-              <a:t>Основни диаграми на потока на данните</a:t>
-            </a:r>
-            <a:endParaRPr lang="en-US" dirty="0">
-              <a:solidFill>
-                <a:schemeClr val="accent1">
-                  <a:tint val="88000"/>
-                  <a:satMod val="150000"/>
-                </a:schemeClr>
-              </a:solidFill>
-            </a:endParaRPr>
-          </a:p>
-        </p:txBody>
-      </p:sp>
-      <p:sp>
-        <p:nvSpPr>
-          <p:cNvPr id="3" name="Content Placeholder 2">
+          <p:cNvPicPr/>
+          <p:nvPr/>
+        </p:nvPicPr>
+        <p:blipFill>
+          <a:blip r:embed="rId2">
             <a:extLst>
-              <a:ext uri="{FF2B5EF4-FFF2-40B4-BE49-F238E27FC236}">
-                <a16:creationId xmlns:a16="http://schemas.microsoft.com/office/drawing/2014/main" id="{3D094B65-DCAD-4B46-8515-49569B1B7E98}"/>
+              <a:ext uri="{28A0092B-C50C-407E-A947-70E740481C1C}">
+                <a14:useLocalDpi xmlns:a14="http://schemas.microsoft.com/office/drawing/2010/main" val="0"/>
               </a:ext>
             </a:extLst>
-          </p:cNvPr>
-          <p:cNvSpPr>
-            <a:spLocks noGrp="1"/>
-          </p:cNvSpPr>
-          <p:nvPr>
-            <p:ph idx="1"/>
-          </p:nvPr>
-        </p:nvSpPr>
-        <p:spPr/>
-        <p:txBody>
-          <a:bodyPr/>
-          <a:lstStyle/>
-          <a:p>
-            <a:endParaRPr lang="en-US"/>
-          </a:p>
-        </p:txBody>
-      </p:sp>
-      <p:sp>
-        <p:nvSpPr>
-          <p:cNvPr id="4" name="Date Placeholder 3">
-            <a:extLst>
-              <a:ext uri="{FF2B5EF4-FFF2-40B4-BE49-F238E27FC236}">
-                <a16:creationId xmlns:a16="http://schemas.microsoft.com/office/drawing/2014/main" id="{3DF8190A-DDDE-408C-99F6-5B72B4494650}"/>
-              </a:ext>
-            </a:extLst>
-          </p:cNvPr>
-          <p:cNvSpPr>
-            <a:spLocks noGrp="1"/>
-          </p:cNvSpPr>
-          <p:nvPr>
-            <p:ph type="dt" sz="half" idx="10"/>
-          </p:nvPr>
-        </p:nvSpPr>
-        <p:spPr/>
-        <p:txBody>
-          <a:bodyPr/>
-          <a:lstStyle/>
-          <a:p>
-            <a:pPr>
-              <a:defRPr/>
-            </a:pPr>
-            <a:r>
-              <a:rPr lang="en-US"/>
-              <a:t>2013</a:t>
-            </a:r>
-            <a:endParaRPr lang="en-US" dirty="0"/>
-          </a:p>
-        </p:txBody>
-      </p:sp>
-      <p:sp>
-        <p:nvSpPr>
-          <p:cNvPr id="6" name="Slide Number Placeholder 5">
-            <a:extLst>
-              <a:ext uri="{FF2B5EF4-FFF2-40B4-BE49-F238E27FC236}">
-                <a16:creationId xmlns:a16="http://schemas.microsoft.com/office/drawing/2014/main" id="{B1DE5695-6493-46B5-B450-A8119E897AF8}"/>
-              </a:ext>
-            </a:extLst>
-          </p:cNvPr>
-          <p:cNvSpPr>
-            <a:spLocks noGrp="1"/>
-          </p:cNvSpPr>
-          <p:nvPr>
-            <p:ph type="sldNum" sz="quarter" idx="12"/>
-          </p:nvPr>
-        </p:nvSpPr>
-        <p:spPr/>
-        <p:txBody>
-          <a:bodyPr/>
-          <a:lstStyle/>
-          <a:p>
-            <a:pPr>
-              <a:defRPr/>
-            </a:pPr>
-            <a:fld id="{2F34750C-19EA-428D-8F45-3D39E0788C18}" type="slidenum">
-              <a:rPr lang="en-US" smtClean="0"/>
-              <a:pPr>
-                <a:defRPr/>
-              </a:pPr>
-              <a:t>13</a:t>
-            </a:fld>
-            <a:endParaRPr lang="en-US" dirty="0">
-              <a:solidFill>
-                <a:srgbClr val="FFFFFF"/>
-              </a:solidFill>
-            </a:endParaRPr>
-          </a:p>
-        </p:txBody>
-      </p:sp>
+          </a:blip>
+          <a:stretch>
+            <a:fillRect/>
+          </a:stretch>
+        </p:blipFill>
+        <p:spPr>
+          <a:xfrm>
+            <a:off x="251520" y="764704"/>
+            <a:ext cx="6624736" cy="5688632"/>
+          </a:xfrm>
+          <a:prstGeom prst="rect">
+            <a:avLst/>
+          </a:prstGeom>
+        </p:spPr>
+      </p:pic>
     </p:spTree>
     <p:extLst>
       <p:ext uri="{BB962C8B-B14F-4D97-AF65-F5344CB8AC3E}">
-        <p14:creationId xmlns:p14="http://schemas.microsoft.com/office/powerpoint/2010/main" val="2248195650"/>
+        <p14:creationId xmlns:p14="http://schemas.microsoft.com/office/powerpoint/2010/main" val="3092236855"/>
       </p:ext>
     </p:extLst>
   </p:cSld>
@@ -7618,13 +7392,7 @@
       </p:grpSpPr>
       <p:sp>
         <p:nvSpPr>
-          <p:cNvPr id="2" name="Title 1">
-            <a:extLst>
-              <a:ext uri="{FF2B5EF4-FFF2-40B4-BE49-F238E27FC236}">
-                <a16:creationId xmlns:a16="http://schemas.microsoft.com/office/drawing/2014/main" id="{81A6B9A3-81A3-447A-AAEC-56E0730E41EB}"/>
-              </a:ext>
-            </a:extLst>
-          </p:cNvPr>
+          <p:cNvPr id="2" name="Title 1"/>
           <p:cNvSpPr>
             <a:spLocks noGrp="1"/>
           </p:cNvSpPr>
@@ -7632,123 +7400,82 @@
             <p:ph type="title"/>
           </p:nvPr>
         </p:nvSpPr>
-        <p:spPr/>
+        <p:spPr>
+          <a:xfrm>
+            <a:off x="603278" y="219770"/>
+            <a:ext cx="6347713" cy="1320800"/>
+          </a:xfrm>
+        </p:spPr>
         <p:txBody>
           <a:bodyPr>
             <a:normAutofit/>
           </a:bodyPr>
           <a:lstStyle/>
           <a:p>
-            <a:r>
-              <a:rPr lang="bg-BG" dirty="0"/>
-              <a:t>Основни диаграми същност връзка</a:t>
-            </a:r>
-            <a:endParaRPr lang="en-US" dirty="0"/>
-          </a:p>
-        </p:txBody>
-      </p:sp>
-      <p:sp>
-        <p:nvSpPr>
-          <p:cNvPr id="3" name="Content Placeholder 2">
+            <a:pPr eaLnBrk="1" fontAlgn="auto" hangingPunct="1">
+              <a:spcAft>
+                <a:spcPts val="0"/>
+              </a:spcAft>
+              <a:defRPr/>
+            </a:pPr>
+            <a:r>
+              <a:rPr lang="bg-BG" dirty="0">
+                <a:solidFill>
+                  <a:schemeClr val="accent1">
+                    <a:tint val="88000"/>
+                    <a:satMod val="150000"/>
+                  </a:schemeClr>
+                </a:solidFill>
+              </a:rPr>
+              <a:t>Основни диаграми на последователност</a:t>
+            </a:r>
+            <a:endParaRPr lang="en-US" dirty="0">
+              <a:solidFill>
+                <a:schemeClr val="accent1">
+                  <a:tint val="88000"/>
+                  <a:satMod val="150000"/>
+                </a:schemeClr>
+              </a:solidFill>
+            </a:endParaRPr>
+          </a:p>
+        </p:txBody>
+      </p:sp>
+      <p:pic>
+        <p:nvPicPr>
+          <p:cNvPr id="4" name="Content Placeholder 3">
             <a:extLst>
               <a:ext uri="{FF2B5EF4-FFF2-40B4-BE49-F238E27FC236}">
-                <a16:creationId xmlns:a16="http://schemas.microsoft.com/office/drawing/2014/main" id="{3D094B65-DCAD-4B46-8515-49569B1B7E98}"/>
+                <a16:creationId xmlns:a16="http://schemas.microsoft.com/office/drawing/2014/main" id="{02EB7927-D663-4FC7-8479-6161D818B8F6}"/>
               </a:ext>
             </a:extLst>
           </p:cNvPr>
-          <p:cNvSpPr>
-            <a:spLocks noGrp="1"/>
-          </p:cNvSpPr>
+          <p:cNvPicPr>
+            <a:picLocks noGrp="1" noChangeAspect="1"/>
+          </p:cNvPicPr>
           <p:nvPr>
             <p:ph idx="1"/>
           </p:nvPr>
-        </p:nvSpPr>
-        <p:spPr/>
-        <p:txBody>
-          <a:bodyPr/>
-          <a:lstStyle/>
-          <a:p>
-            <a:endParaRPr lang="en-US" dirty="0"/>
-          </a:p>
-        </p:txBody>
-      </p:sp>
-      <p:sp>
-        <p:nvSpPr>
-          <p:cNvPr id="4" name="Date Placeholder 3">
+        </p:nvPicPr>
+        <p:blipFill>
+          <a:blip r:embed="rId2">
             <a:extLst>
-              <a:ext uri="{FF2B5EF4-FFF2-40B4-BE49-F238E27FC236}">
-                <a16:creationId xmlns:a16="http://schemas.microsoft.com/office/drawing/2014/main" id="{3DF8190A-DDDE-408C-99F6-5B72B4494650}"/>
+              <a:ext uri="{28A0092B-C50C-407E-A947-70E740481C1C}">
+                <a14:useLocalDpi xmlns:a14="http://schemas.microsoft.com/office/drawing/2010/main" val="0"/>
               </a:ext>
             </a:extLst>
-          </p:cNvPr>
-          <p:cNvSpPr>
-            <a:spLocks noGrp="1"/>
-          </p:cNvSpPr>
-          <p:nvPr>
-            <p:ph type="dt" sz="half" idx="10"/>
-          </p:nvPr>
-        </p:nvSpPr>
-        <p:spPr/>
-        <p:txBody>
-          <a:bodyPr/>
-          <a:lstStyle/>
-          <a:p>
-            <a:pPr>
-              <a:defRPr/>
-            </a:pPr>
-            <a:r>
-              <a:rPr lang="en-US"/>
-              <a:t>2013</a:t>
-            </a:r>
-            <a:endParaRPr lang="en-US" dirty="0"/>
-          </a:p>
-        </p:txBody>
-      </p:sp>
-      <p:sp>
-        <p:nvSpPr>
-          <p:cNvPr id="6" name="Slide Number Placeholder 5">
-            <a:extLst>
-              <a:ext uri="{FF2B5EF4-FFF2-40B4-BE49-F238E27FC236}">
-                <a16:creationId xmlns:a16="http://schemas.microsoft.com/office/drawing/2014/main" id="{B1DE5695-6493-46B5-B450-A8119E897AF8}"/>
-              </a:ext>
-            </a:extLst>
-          </p:cNvPr>
-          <p:cNvSpPr>
-            <a:spLocks noGrp="1"/>
-          </p:cNvSpPr>
-          <p:nvPr>
-            <p:ph type="sldNum" sz="quarter" idx="12"/>
-          </p:nvPr>
-        </p:nvSpPr>
-        <p:spPr/>
-        <p:txBody>
-          <a:bodyPr/>
-          <a:lstStyle/>
-          <a:p>
-            <a:pPr>
-              <a:defRPr/>
-            </a:pPr>
-            <a:fld id="{2F34750C-19EA-428D-8F45-3D39E0788C18}" type="slidenum">
-              <a:rPr lang="en-US" smtClean="0"/>
-              <a:pPr>
-                <a:defRPr/>
-              </a:pPr>
-              <a:t>14</a:t>
-            </a:fld>
-            <a:endParaRPr lang="en-US" dirty="0">
-              <a:solidFill>
-                <a:srgbClr val="FFFFFF"/>
-              </a:solidFill>
-            </a:endParaRPr>
-          </a:p>
-        </p:txBody>
-      </p:sp>
+          </a:blip>
+          <a:stretch>
+            <a:fillRect/>
+          </a:stretch>
+        </p:blipFill>
+        <p:spPr>
+          <a:xfrm>
+            <a:off x="603278" y="1700808"/>
+            <a:ext cx="6698705" cy="4707831"/>
+          </a:xfrm>
+        </p:spPr>
+      </p:pic>
     </p:spTree>
-    <p:extLst>
-      <p:ext uri="{BB962C8B-B14F-4D97-AF65-F5344CB8AC3E}">
-        <p14:creationId xmlns:p14="http://schemas.microsoft.com/office/powerpoint/2010/main" val="1934192974"/>
-      </p:ext>
-    </p:extLst>
   </p:cSld>
   <p:clrMapOvr>
     <a:masterClrMapping/>
@@ -7773,115 +7500,47 @@
           <a:chExt cx="0" cy="0"/>
         </a:xfrm>
       </p:grpSpPr>
-      <p:sp>
-        <p:nvSpPr>
-          <p:cNvPr id="2" name="Title 1"/>
-          <p:cNvSpPr>
-            <a:spLocks noGrp="1"/>
-          </p:cNvSpPr>
-          <p:nvPr>
-            <p:ph type="title"/>
-          </p:nvPr>
-        </p:nvSpPr>
-        <p:spPr/>
-        <p:txBody>
-          <a:bodyPr/>
-          <a:lstStyle/>
-          <a:p>
-            <a:pPr eaLnBrk="1" fontAlgn="auto" hangingPunct="1">
-              <a:spcAft>
-                <a:spcPts val="0"/>
-              </a:spcAft>
-              <a:defRPr/>
-            </a:pPr>
-            <a:r>
-              <a:rPr lang="bg-BG" dirty="0">
-                <a:solidFill>
-                  <a:schemeClr val="accent1">
-                    <a:tint val="88000"/>
-                    <a:satMod val="150000"/>
-                  </a:schemeClr>
-                </a:solidFill>
-              </a:rPr>
-              <a:t>Бъдещи насоки за развитие</a:t>
-            </a:r>
-            <a:endParaRPr lang="en-US" dirty="0">
-              <a:solidFill>
-                <a:schemeClr val="accent1">
-                  <a:tint val="88000"/>
-                  <a:satMod val="150000"/>
-                </a:schemeClr>
-              </a:solidFill>
-            </a:endParaRPr>
-          </a:p>
-        </p:txBody>
-      </p:sp>
-      <p:sp>
-        <p:nvSpPr>
-          <p:cNvPr id="25602" name="Content Placeholder 2"/>
-          <p:cNvSpPr>
-            <a:spLocks noGrp="1"/>
-          </p:cNvSpPr>
+      <p:pic>
+        <p:nvPicPr>
+          <p:cNvPr id="8" name="Content Placeholder 7">
+            <a:extLst>
+              <a:ext uri="{FF2B5EF4-FFF2-40B4-BE49-F238E27FC236}">
+                <a16:creationId xmlns:a16="http://schemas.microsoft.com/office/drawing/2014/main" id="{6837D43B-0989-40E0-B1E2-996D1A4A214B}"/>
+              </a:ext>
+            </a:extLst>
+          </p:cNvPr>
+          <p:cNvPicPr>
+            <a:picLocks noGrp="1" noChangeAspect="1"/>
+          </p:cNvPicPr>
           <p:nvPr>
             <p:ph idx="1"/>
           </p:nvPr>
-        </p:nvSpPr>
-        <p:spPr/>
-        <p:txBody>
-          <a:bodyPr/>
-          <a:lstStyle/>
-          <a:p>
-            <a:pPr eaLnBrk="1" hangingPunct="1"/>
-            <a:r>
-              <a:rPr lang="bg-BG"/>
-              <a:t>Анализ на резултатите</a:t>
-            </a:r>
-            <a:endParaRPr lang="en-US"/>
-          </a:p>
-          <a:p>
-            <a:pPr eaLnBrk="1" hangingPunct="1"/>
-            <a:r>
-              <a:rPr lang="bg-BG"/>
-              <a:t>Бъдещи насоки за развитие</a:t>
-            </a:r>
-            <a:endParaRPr lang="en-US"/>
-          </a:p>
-        </p:txBody>
-      </p:sp>
-      <p:sp>
-        <p:nvSpPr>
-          <p:cNvPr id="6" name="Slide Number Placeholder 5"/>
-          <p:cNvSpPr>
-            <a:spLocks noGrp="1"/>
-          </p:cNvSpPr>
-          <p:nvPr>
-            <p:ph type="sldNum" sz="quarter" idx="12"/>
-          </p:nvPr>
-        </p:nvSpPr>
-        <p:spPr/>
-        <p:txBody>
-          <a:bodyPr/>
-          <a:lstStyle/>
-          <a:p>
-            <a:pPr>
-              <a:defRPr/>
-            </a:pPr>
-            <a:fld id="{08BDA67E-C7FB-4691-BCC0-E2B1533CCD31}" type="slidenum">
-              <a:rPr lang="en-US"/>
-              <a:pPr>
-                <a:defRPr/>
-              </a:pPr>
-              <a:t>15</a:t>
-            </a:fld>
-            <a:endParaRPr lang="en-US" dirty="0">
-              <a:solidFill>
-                <a:srgbClr val="FFFFFF"/>
-              </a:solidFill>
-            </a:endParaRPr>
-          </a:p>
-        </p:txBody>
-      </p:sp>
+        </p:nvPicPr>
+        <p:blipFill>
+          <a:blip r:embed="rId2">
+            <a:extLst>
+              <a:ext uri="{28A0092B-C50C-407E-A947-70E740481C1C}">
+                <a14:useLocalDpi xmlns:a14="http://schemas.microsoft.com/office/drawing/2010/main" val="0"/>
+              </a:ext>
+            </a:extLst>
+          </a:blip>
+          <a:stretch>
+            <a:fillRect/>
+          </a:stretch>
+        </p:blipFill>
+        <p:spPr>
+          <a:xfrm>
+            <a:off x="539552" y="267606"/>
+            <a:ext cx="6192688" cy="6322787"/>
+          </a:xfrm>
+        </p:spPr>
+      </p:pic>
     </p:spTree>
+    <p:extLst>
+      <p:ext uri="{BB962C8B-B14F-4D97-AF65-F5344CB8AC3E}">
+        <p14:creationId xmlns:p14="http://schemas.microsoft.com/office/powerpoint/2010/main" val="3053528311"/>
+      </p:ext>
+    </p:extLst>
   </p:cSld>
   <p:clrMapOvr>
     <a:masterClrMapping/>
@@ -7906,6 +7565,71 @@
           <a:chExt cx="0" cy="0"/>
         </a:xfrm>
       </p:grpSpPr>
+      <p:pic>
+        <p:nvPicPr>
+          <p:cNvPr id="8" name="Content Placeholder 7">
+            <a:extLst>
+              <a:ext uri="{FF2B5EF4-FFF2-40B4-BE49-F238E27FC236}">
+                <a16:creationId xmlns:a16="http://schemas.microsoft.com/office/drawing/2014/main" id="{B9985FE6-DF2D-4616-9BDD-58776FFF3C4D}"/>
+              </a:ext>
+            </a:extLst>
+          </p:cNvPr>
+          <p:cNvPicPr>
+            <a:picLocks noGrp="1" noChangeAspect="1"/>
+          </p:cNvPicPr>
+          <p:nvPr>
+            <p:ph idx="1"/>
+          </p:nvPr>
+        </p:nvPicPr>
+        <p:blipFill>
+          <a:blip r:embed="rId2">
+            <a:extLst>
+              <a:ext uri="{28A0092B-C50C-407E-A947-70E740481C1C}">
+                <a14:useLocalDpi xmlns:a14="http://schemas.microsoft.com/office/drawing/2010/main" val="0"/>
+              </a:ext>
+            </a:extLst>
+          </a:blip>
+          <a:stretch>
+            <a:fillRect/>
+          </a:stretch>
+        </p:blipFill>
+        <p:spPr>
+          <a:xfrm>
+            <a:off x="395536" y="764704"/>
+            <a:ext cx="8202429" cy="5688632"/>
+          </a:xfrm>
+        </p:spPr>
+      </p:pic>
+    </p:spTree>
+    <p:extLst>
+      <p:ext uri="{BB962C8B-B14F-4D97-AF65-F5344CB8AC3E}">
+        <p14:creationId xmlns:p14="http://schemas.microsoft.com/office/powerpoint/2010/main" val="3652835859"/>
+      </p:ext>
+    </p:extLst>
+  </p:cSld>
+  <p:clrMapOvr>
+    <a:masterClrMapping/>
+  </p:clrMapOvr>
+</p:sld>
+</file>
+
+<file path=ppt/slides/slide17.xml><?xml version="1.0" encoding="utf-8"?>
+<p:sld xmlns:a="http://schemas.openxmlformats.org/drawingml/2006/main" xmlns:r="http://schemas.openxmlformats.org/officeDocument/2006/relationships" xmlns:p="http://schemas.openxmlformats.org/presentationml/2006/main">
+  <p:cSld>
+    <p:spTree>
+      <p:nvGrpSpPr>
+        <p:cNvPr id="1" name=""/>
+        <p:cNvGrpSpPr/>
+        <p:nvPr/>
+      </p:nvGrpSpPr>
+      <p:grpSpPr>
+        <a:xfrm>
+          <a:off x="0" y="0"/>
+          <a:ext cx="0" cy="0"/>
+          <a:chOff x="0" y="0"/>
+          <a:chExt cx="0" cy="0"/>
+        </a:xfrm>
+      </p:grpSpPr>
       <p:sp>
         <p:nvSpPr>
           <p:cNvPr id="2" name="Title 1"/>
@@ -7918,7 +7642,9 @@
         </p:nvSpPr>
         <p:spPr/>
         <p:txBody>
-          <a:bodyPr/>
+          <a:bodyPr>
+            <a:normAutofit/>
+          </a:bodyPr>
           <a:lstStyle/>
           <a:p>
             <a:pPr eaLnBrk="1" fontAlgn="auto" hangingPunct="1">
@@ -7928,78 +7654,198 @@
               <a:defRPr/>
             </a:pPr>
             <a:r>
-              <a:rPr lang="bg-BG" dirty="0"/>
-              <a:t>Въпроси?</a:t>
-            </a:r>
-            <a:endParaRPr lang="en-US" dirty="0"/>
-          </a:p>
-        </p:txBody>
-      </p:sp>
-      <p:sp>
-        <p:nvSpPr>
-          <p:cNvPr id="26626" name="Text Placeholder 2"/>
-          <p:cNvSpPr>
-            <a:spLocks noGrp="1"/>
-          </p:cNvSpPr>
-          <p:nvPr>
-            <p:ph type="body" idx="1"/>
-          </p:nvPr>
-        </p:nvSpPr>
-        <p:spPr/>
-        <p:txBody>
-          <a:bodyPr/>
-          <a:lstStyle/>
-          <a:p>
-            <a:pPr marR="0" eaLnBrk="1" hangingPunct="1">
-              <a:spcBef>
-                <a:spcPct val="0"/>
-              </a:spcBef>
-              <a:spcAft>
-                <a:spcPct val="0"/>
-              </a:spcAft>
-            </a:pPr>
-            <a:endParaRPr lang="bg-BG">
+              <a:rPr lang="bg-BG" dirty="0">
+                <a:solidFill>
+                  <a:schemeClr val="accent1">
+                    <a:tint val="88000"/>
+                    <a:satMod val="150000"/>
+                  </a:schemeClr>
+                </a:solidFill>
+              </a:rPr>
+              <a:t>Основни диаграми на активностите</a:t>
+            </a:r>
+            <a:endParaRPr lang="en-US" dirty="0">
               <a:solidFill>
-                <a:srgbClr val="B95C00"/>
+                <a:schemeClr val="accent1">
+                  <a:tint val="88000"/>
+                  <a:satMod val="150000"/>
+                </a:schemeClr>
               </a:solidFill>
             </a:endParaRPr>
           </a:p>
         </p:txBody>
       </p:sp>
-      <p:sp>
-        <p:nvSpPr>
-          <p:cNvPr id="6" name="Slide Number Placeholder 5"/>
-          <p:cNvSpPr>
-            <a:spLocks noGrp="1"/>
-          </p:cNvSpPr>
-          <p:nvPr>
-            <p:ph type="sldNum" sz="quarter" idx="12"/>
-          </p:nvPr>
-        </p:nvSpPr>
-        <p:spPr/>
-        <p:txBody>
-          <a:bodyPr/>
-          <a:lstStyle/>
-          <a:p>
-            <a:pPr>
-              <a:defRPr/>
-            </a:pPr>
-            <a:fld id="{1392F171-BFFE-42CD-A24C-B7650956BF18}" type="slidenum">
-              <a:rPr lang="en-US"/>
-              <a:pPr>
-                <a:defRPr/>
-              </a:pPr>
-              <a:t>16</a:t>
-            </a:fld>
-            <a:endParaRPr lang="en-US" sz="2400" dirty="0">
-              <a:solidFill>
-                <a:srgbClr val="FFFFFF"/>
-              </a:solidFill>
-            </a:endParaRPr>
-          </a:p>
-        </p:txBody>
-      </p:sp>
+      <p:pic>
+        <p:nvPicPr>
+          <p:cNvPr id="9" name="Content Placeholder 8">
+            <a:extLst>
+              <a:ext uri="{FF2B5EF4-FFF2-40B4-BE49-F238E27FC236}">
+                <a16:creationId xmlns:a16="http://schemas.microsoft.com/office/drawing/2014/main" id="{F3EC3156-3A0A-4708-AC13-8EE46C7C8E6D}"/>
+              </a:ext>
+            </a:extLst>
+          </p:cNvPr>
+          <p:cNvPicPr>
+            <a:picLocks noGrp="1"/>
+          </p:cNvPicPr>
+          <p:nvPr>
+            <p:ph idx="1"/>
+          </p:nvPr>
+        </p:nvPicPr>
+        <p:blipFill>
+          <a:blip r:embed="rId2">
+            <a:extLst>
+              <a:ext uri="{28A0092B-C50C-407E-A947-70E740481C1C}">
+                <a14:useLocalDpi xmlns:a14="http://schemas.microsoft.com/office/drawing/2010/main" val="0"/>
+              </a:ext>
+            </a:extLst>
+          </a:blip>
+          <a:stretch>
+            <a:fillRect/>
+          </a:stretch>
+        </p:blipFill>
+        <p:spPr>
+          <a:xfrm>
+            <a:off x="0" y="1940416"/>
+            <a:ext cx="9144000" cy="4752528"/>
+          </a:xfrm>
+          <a:prstGeom prst="rect">
+            <a:avLst/>
+          </a:prstGeom>
+        </p:spPr>
+      </p:pic>
     </p:spTree>
+  </p:cSld>
+  <p:clrMapOvr>
+    <a:masterClrMapping/>
+  </p:clrMapOvr>
+</p:sld>
+</file>
+
+<file path=ppt/slides/slide18.xml><?xml version="1.0" encoding="utf-8"?>
+<p:sld xmlns:a="http://schemas.openxmlformats.org/drawingml/2006/main" xmlns:r="http://schemas.openxmlformats.org/officeDocument/2006/relationships" xmlns:p="http://schemas.openxmlformats.org/presentationml/2006/main">
+  <p:cSld>
+    <p:spTree>
+      <p:nvGrpSpPr>
+        <p:cNvPr id="1" name=""/>
+        <p:cNvGrpSpPr/>
+        <p:nvPr/>
+      </p:nvGrpSpPr>
+      <p:grpSpPr>
+        <a:xfrm>
+          <a:off x="0" y="0"/>
+          <a:ext cx="0" cy="0"/>
+          <a:chOff x="0" y="0"/>
+          <a:chExt cx="0" cy="0"/>
+        </a:xfrm>
+      </p:grpSpPr>
+      <p:pic>
+        <p:nvPicPr>
+          <p:cNvPr id="8" name="Content Placeholder 6">
+            <a:extLst>
+              <a:ext uri="{FF2B5EF4-FFF2-40B4-BE49-F238E27FC236}">
+                <a16:creationId xmlns:a16="http://schemas.microsoft.com/office/drawing/2014/main" id="{76546E0E-A791-43B3-B962-6BB1B0C1B72C}"/>
+              </a:ext>
+            </a:extLst>
+          </p:cNvPr>
+          <p:cNvPicPr>
+            <a:picLocks noGrp="1"/>
+          </p:cNvPicPr>
+          <p:nvPr>
+            <p:ph idx="1"/>
+          </p:nvPr>
+        </p:nvPicPr>
+        <p:blipFill>
+          <a:blip r:embed="rId2">
+            <a:extLst>
+              <a:ext uri="{28A0092B-C50C-407E-A947-70E740481C1C}">
+                <a14:useLocalDpi xmlns:a14="http://schemas.microsoft.com/office/drawing/2010/main" val="0"/>
+              </a:ext>
+            </a:extLst>
+          </a:blip>
+          <a:stretch>
+            <a:fillRect/>
+          </a:stretch>
+        </p:blipFill>
+        <p:spPr>
+          <a:xfrm>
+            <a:off x="683568" y="0"/>
+            <a:ext cx="7272808" cy="6858000"/>
+          </a:xfrm>
+          <a:prstGeom prst="rect">
+            <a:avLst/>
+          </a:prstGeom>
+        </p:spPr>
+      </p:pic>
+    </p:spTree>
+    <p:extLst>
+      <p:ext uri="{BB962C8B-B14F-4D97-AF65-F5344CB8AC3E}">
+        <p14:creationId xmlns:p14="http://schemas.microsoft.com/office/powerpoint/2010/main" val="3750959364"/>
+      </p:ext>
+    </p:extLst>
+  </p:cSld>
+  <p:clrMapOvr>
+    <a:masterClrMapping/>
+  </p:clrMapOvr>
+</p:sld>
+</file>
+
+<file path=ppt/slides/slide19.xml><?xml version="1.0" encoding="utf-8"?>
+<p:sld xmlns:a="http://schemas.openxmlformats.org/drawingml/2006/main" xmlns:r="http://schemas.openxmlformats.org/officeDocument/2006/relationships" xmlns:p="http://schemas.openxmlformats.org/presentationml/2006/main">
+  <p:cSld>
+    <p:spTree>
+      <p:nvGrpSpPr>
+        <p:cNvPr id="1" name=""/>
+        <p:cNvGrpSpPr/>
+        <p:nvPr/>
+      </p:nvGrpSpPr>
+      <p:grpSpPr>
+        <a:xfrm>
+          <a:off x="0" y="0"/>
+          <a:ext cx="0" cy="0"/>
+          <a:chOff x="0" y="0"/>
+          <a:chExt cx="0" cy="0"/>
+        </a:xfrm>
+      </p:grpSpPr>
+      <p:pic>
+        <p:nvPicPr>
+          <p:cNvPr id="7" name="Picture 6">
+            <a:extLst>
+              <a:ext uri="{FF2B5EF4-FFF2-40B4-BE49-F238E27FC236}">
+                <a16:creationId xmlns:a16="http://schemas.microsoft.com/office/drawing/2014/main" id="{C00D3495-50EA-47D4-8719-C0D232BA5856}"/>
+              </a:ext>
+            </a:extLst>
+          </p:cNvPr>
+          <p:cNvPicPr/>
+          <p:nvPr/>
+        </p:nvPicPr>
+        <p:blipFill>
+          <a:blip r:embed="rId2">
+            <a:extLst>
+              <a:ext uri="{28A0092B-C50C-407E-A947-70E740481C1C}">
+                <a14:useLocalDpi xmlns:a14="http://schemas.microsoft.com/office/drawing/2010/main" val="0"/>
+              </a:ext>
+            </a:extLst>
+          </a:blip>
+          <a:stretch>
+            <a:fillRect/>
+          </a:stretch>
+        </p:blipFill>
+        <p:spPr>
+          <a:xfrm>
+            <a:off x="0" y="0"/>
+            <a:ext cx="7308304" cy="6858000"/>
+          </a:xfrm>
+          <a:prstGeom prst="rect">
+            <a:avLst/>
+          </a:prstGeom>
+        </p:spPr>
+      </p:pic>
+    </p:spTree>
+    <p:extLst>
+      <p:ext uri="{BB962C8B-B14F-4D97-AF65-F5344CB8AC3E}">
+        <p14:creationId xmlns:p14="http://schemas.microsoft.com/office/powerpoint/2010/main" val="1844192269"/>
+      </p:ext>
+    </p:extLst>
   </p:cSld>
   <p:clrMapOvr>
     <a:masterClrMapping/>
@@ -8219,14 +8065,109 @@
           </a:p>
         </p:txBody>
       </p:sp>
-      <p:sp>
-        <p:nvSpPr>
-          <p:cNvPr id="5" name="Slide Number Placeholder 4"/>
-          <p:cNvSpPr>
-            <a:spLocks noGrp="1"/>
-          </p:cNvSpPr>
-          <p:nvPr>
-            <p:ph type="sldNum" sz="quarter" idx="12"/>
+    </p:spTree>
+  </p:cSld>
+  <p:clrMapOvr>
+    <a:masterClrMapping/>
+  </p:clrMapOvr>
+</p:sld>
+</file>
+
+<file path=ppt/slides/slide20.xml><?xml version="1.0" encoding="utf-8"?>
+<p:sld xmlns:a="http://schemas.openxmlformats.org/drawingml/2006/main" xmlns:r="http://schemas.openxmlformats.org/officeDocument/2006/relationships" xmlns:p="http://schemas.openxmlformats.org/presentationml/2006/main">
+  <p:cSld>
+    <p:spTree>
+      <p:nvGrpSpPr>
+        <p:cNvPr id="1" name=""/>
+        <p:cNvGrpSpPr/>
+        <p:nvPr/>
+      </p:nvGrpSpPr>
+      <p:grpSpPr>
+        <a:xfrm>
+          <a:off x="0" y="0"/>
+          <a:ext cx="0" cy="0"/>
+          <a:chOff x="0" y="0"/>
+          <a:chExt cx="0" cy="0"/>
+        </a:xfrm>
+      </p:grpSpPr>
+      <p:pic>
+        <p:nvPicPr>
+          <p:cNvPr id="7" name="Picture 6">
+            <a:extLst>
+              <a:ext uri="{FF2B5EF4-FFF2-40B4-BE49-F238E27FC236}">
+                <a16:creationId xmlns:a16="http://schemas.microsoft.com/office/drawing/2014/main" id="{C66C75D8-C60A-477B-A29F-3C613D051BD4}"/>
+              </a:ext>
+            </a:extLst>
+          </p:cNvPr>
+          <p:cNvPicPr/>
+          <p:nvPr/>
+        </p:nvPicPr>
+        <p:blipFill>
+          <a:blip r:embed="rId2">
+            <a:extLst>
+              <a:ext uri="{28A0092B-C50C-407E-A947-70E740481C1C}">
+                <a14:useLocalDpi xmlns:a14="http://schemas.microsoft.com/office/drawing/2010/main" val="0"/>
+              </a:ext>
+            </a:extLst>
+          </a:blip>
+          <a:stretch>
+            <a:fillRect/>
+          </a:stretch>
+        </p:blipFill>
+        <p:spPr>
+          <a:xfrm>
+            <a:off x="0" y="0"/>
+            <a:ext cx="7812360" cy="6858000"/>
+          </a:xfrm>
+          <a:prstGeom prst="rect">
+            <a:avLst/>
+          </a:prstGeom>
+        </p:spPr>
+      </p:pic>
+    </p:spTree>
+    <p:extLst>
+      <p:ext uri="{BB962C8B-B14F-4D97-AF65-F5344CB8AC3E}">
+        <p14:creationId xmlns:p14="http://schemas.microsoft.com/office/powerpoint/2010/main" val="2350748779"/>
+      </p:ext>
+    </p:extLst>
+  </p:cSld>
+  <p:clrMapOvr>
+    <a:masterClrMapping/>
+  </p:clrMapOvr>
+</p:sld>
+</file>
+
+<file path=ppt/slides/slide21.xml><?xml version="1.0" encoding="utf-8"?>
+<p:sld xmlns:a="http://schemas.openxmlformats.org/drawingml/2006/main" xmlns:r="http://schemas.openxmlformats.org/officeDocument/2006/relationships" xmlns:p="http://schemas.openxmlformats.org/presentationml/2006/main">
+  <p:cSld>
+    <p:spTree>
+      <p:nvGrpSpPr>
+        <p:cNvPr id="1" name=""/>
+        <p:cNvGrpSpPr/>
+        <p:nvPr/>
+      </p:nvGrpSpPr>
+      <p:grpSpPr>
+        <a:xfrm>
+          <a:off x="0" y="0"/>
+          <a:ext cx="0" cy="0"/>
+          <a:chOff x="0" y="0"/>
+          <a:chExt cx="0" cy="0"/>
+        </a:xfrm>
+      </p:grpSpPr>
+      <p:sp>
+        <p:nvSpPr>
+          <p:cNvPr id="2" name="Title 1">
+            <a:extLst>
+              <a:ext uri="{FF2B5EF4-FFF2-40B4-BE49-F238E27FC236}">
+                <a16:creationId xmlns:a16="http://schemas.microsoft.com/office/drawing/2014/main" id="{81A6B9A3-81A3-447A-AAEC-56E0730E41EB}"/>
+              </a:ext>
+            </a:extLst>
+          </p:cNvPr>
+          <p:cNvSpPr>
+            <a:spLocks noGrp="1"/>
+          </p:cNvSpPr>
+          <p:nvPr>
+            <p:ph type="title"/>
           </p:nvPr>
         </p:nvSpPr>
         <p:spPr/>
@@ -8236,21 +8177,392 @@
           </a:bodyPr>
           <a:lstStyle/>
           <a:p>
-            <a:pPr>
+            <a:r>
+              <a:rPr lang="bg-BG" dirty="0">
+                <a:solidFill>
+                  <a:schemeClr val="accent1">
+                    <a:tint val="88000"/>
+                    <a:satMod val="150000"/>
+                  </a:schemeClr>
+                </a:solidFill>
+              </a:rPr>
+              <a:t>Основни диаграми на потока на данните</a:t>
+            </a:r>
+            <a:endParaRPr lang="en-US" dirty="0">
+              <a:solidFill>
+                <a:schemeClr val="accent1">
+                  <a:tint val="88000"/>
+                  <a:satMod val="150000"/>
+                </a:schemeClr>
+              </a:solidFill>
+            </a:endParaRPr>
+          </a:p>
+        </p:txBody>
+      </p:sp>
+      <p:pic>
+        <p:nvPicPr>
+          <p:cNvPr id="8" name="Content Placeholder 7">
+            <a:extLst>
+              <a:ext uri="{FF2B5EF4-FFF2-40B4-BE49-F238E27FC236}">
+                <a16:creationId xmlns:a16="http://schemas.microsoft.com/office/drawing/2014/main" id="{1F8FE5A2-10A7-40D8-BB1F-5FB284546BCB}"/>
+              </a:ext>
+            </a:extLst>
+          </p:cNvPr>
+          <p:cNvPicPr>
+            <a:picLocks noGrp="1" noChangeAspect="1"/>
+          </p:cNvPicPr>
+          <p:nvPr>
+            <p:ph idx="1"/>
+          </p:nvPr>
+        </p:nvPicPr>
+        <p:blipFill>
+          <a:blip r:embed="rId2">
+            <a:extLst>
+              <a:ext uri="{28A0092B-C50C-407E-A947-70E740481C1C}">
+                <a14:useLocalDpi xmlns:a14="http://schemas.microsoft.com/office/drawing/2010/main" val="0"/>
+              </a:ext>
+            </a:extLst>
+          </a:blip>
+          <a:stretch>
+            <a:fillRect/>
+          </a:stretch>
+        </p:blipFill>
+        <p:spPr>
+          <a:xfrm>
+            <a:off x="592935" y="2276872"/>
+            <a:ext cx="6423912" cy="3281098"/>
+          </a:xfrm>
+        </p:spPr>
+      </p:pic>
+    </p:spTree>
+    <p:extLst>
+      <p:ext uri="{BB962C8B-B14F-4D97-AF65-F5344CB8AC3E}">
+        <p14:creationId xmlns:p14="http://schemas.microsoft.com/office/powerpoint/2010/main" val="2248195650"/>
+      </p:ext>
+    </p:extLst>
+  </p:cSld>
+  <p:clrMapOvr>
+    <a:masterClrMapping/>
+  </p:clrMapOvr>
+</p:sld>
+</file>
+
+<file path=ppt/slides/slide22.xml><?xml version="1.0" encoding="utf-8"?>
+<p:sld xmlns:a="http://schemas.openxmlformats.org/drawingml/2006/main" xmlns:r="http://schemas.openxmlformats.org/officeDocument/2006/relationships" xmlns:p="http://schemas.openxmlformats.org/presentationml/2006/main">
+  <p:cSld>
+    <p:spTree>
+      <p:nvGrpSpPr>
+        <p:cNvPr id="1" name=""/>
+        <p:cNvGrpSpPr/>
+        <p:nvPr/>
+      </p:nvGrpSpPr>
+      <p:grpSpPr>
+        <a:xfrm>
+          <a:off x="0" y="0"/>
+          <a:ext cx="0" cy="0"/>
+          <a:chOff x="0" y="0"/>
+          <a:chExt cx="0" cy="0"/>
+        </a:xfrm>
+      </p:grpSpPr>
+      <p:pic>
+        <p:nvPicPr>
+          <p:cNvPr id="12" name="Content Placeholder 11">
+            <a:extLst>
+              <a:ext uri="{FF2B5EF4-FFF2-40B4-BE49-F238E27FC236}">
+                <a16:creationId xmlns:a16="http://schemas.microsoft.com/office/drawing/2014/main" id="{BF00D361-0362-4DC1-929B-1A6D35AAE976}"/>
+              </a:ext>
+            </a:extLst>
+          </p:cNvPr>
+          <p:cNvPicPr>
+            <a:picLocks noGrp="1" noChangeAspect="1"/>
+          </p:cNvPicPr>
+          <p:nvPr>
+            <p:ph idx="1"/>
+          </p:nvPr>
+        </p:nvPicPr>
+        <p:blipFill>
+          <a:blip r:embed="rId2">
+            <a:extLst>
+              <a:ext uri="{28A0092B-C50C-407E-A947-70E740481C1C}">
+                <a14:useLocalDpi xmlns:a14="http://schemas.microsoft.com/office/drawing/2010/main" val="0"/>
+              </a:ext>
+            </a:extLst>
+          </a:blip>
+          <a:stretch>
+            <a:fillRect/>
+          </a:stretch>
+        </p:blipFill>
+        <p:spPr>
+          <a:xfrm>
+            <a:off x="611560" y="332656"/>
+            <a:ext cx="6084512" cy="5976664"/>
+          </a:xfrm>
+        </p:spPr>
+      </p:pic>
+    </p:spTree>
+    <p:extLst>
+      <p:ext uri="{BB962C8B-B14F-4D97-AF65-F5344CB8AC3E}">
+        <p14:creationId xmlns:p14="http://schemas.microsoft.com/office/powerpoint/2010/main" val="1401990135"/>
+      </p:ext>
+    </p:extLst>
+  </p:cSld>
+  <p:clrMapOvr>
+    <a:masterClrMapping/>
+  </p:clrMapOvr>
+</p:sld>
+</file>
+
+<file path=ppt/slides/slide23.xml><?xml version="1.0" encoding="utf-8"?>
+<p:sld xmlns:a="http://schemas.openxmlformats.org/drawingml/2006/main" xmlns:r="http://schemas.openxmlformats.org/officeDocument/2006/relationships" xmlns:p="http://schemas.openxmlformats.org/presentationml/2006/main">
+  <p:cSld>
+    <p:spTree>
+      <p:nvGrpSpPr>
+        <p:cNvPr id="1" name=""/>
+        <p:cNvGrpSpPr/>
+        <p:nvPr/>
+      </p:nvGrpSpPr>
+      <p:grpSpPr>
+        <a:xfrm>
+          <a:off x="0" y="0"/>
+          <a:ext cx="0" cy="0"/>
+          <a:chOff x="0" y="0"/>
+          <a:chExt cx="0" cy="0"/>
+        </a:xfrm>
+      </p:grpSpPr>
+      <p:sp>
+        <p:nvSpPr>
+          <p:cNvPr id="2" name="Title 1">
+            <a:extLst>
+              <a:ext uri="{FF2B5EF4-FFF2-40B4-BE49-F238E27FC236}">
+                <a16:creationId xmlns:a16="http://schemas.microsoft.com/office/drawing/2014/main" id="{81A6B9A3-81A3-447A-AAEC-56E0730E41EB}"/>
+              </a:ext>
+            </a:extLst>
+          </p:cNvPr>
+          <p:cNvSpPr>
+            <a:spLocks noGrp="1"/>
+          </p:cNvSpPr>
+          <p:nvPr>
+            <p:ph type="title"/>
+          </p:nvPr>
+        </p:nvSpPr>
+        <p:spPr>
+          <a:xfrm>
+            <a:off x="251520" y="155575"/>
+            <a:ext cx="6347713" cy="1320800"/>
+          </a:xfrm>
+        </p:spPr>
+        <p:txBody>
+          <a:bodyPr>
+            <a:normAutofit/>
+          </a:bodyPr>
+          <a:lstStyle/>
+          <a:p>
+            <a:r>
+              <a:rPr lang="bg-BG" dirty="0"/>
+              <a:t>Основни диаграми същност връзка</a:t>
+            </a:r>
+            <a:endParaRPr lang="en-US" dirty="0"/>
+          </a:p>
+        </p:txBody>
+      </p:sp>
+      <p:pic>
+        <p:nvPicPr>
+          <p:cNvPr id="8" name="Content Placeholder 7">
+            <a:extLst>
+              <a:ext uri="{FF2B5EF4-FFF2-40B4-BE49-F238E27FC236}">
+                <a16:creationId xmlns:a16="http://schemas.microsoft.com/office/drawing/2014/main" id="{40AACF60-9A69-4439-8BE0-2EEFC2739C8A}"/>
+              </a:ext>
+            </a:extLst>
+          </p:cNvPr>
+          <p:cNvPicPr>
+            <a:picLocks noGrp="1" noChangeAspect="1"/>
+          </p:cNvPicPr>
+          <p:nvPr>
+            <p:ph idx="1"/>
+          </p:nvPr>
+        </p:nvPicPr>
+        <p:blipFill>
+          <a:blip r:embed="rId2">
+            <a:extLst>
+              <a:ext uri="{28A0092B-C50C-407E-A947-70E740481C1C}">
+                <a14:useLocalDpi xmlns:a14="http://schemas.microsoft.com/office/drawing/2010/main" val="0"/>
+              </a:ext>
+            </a:extLst>
+          </a:blip>
+          <a:stretch>
+            <a:fillRect/>
+          </a:stretch>
+        </p:blipFill>
+        <p:spPr>
+          <a:xfrm>
+            <a:off x="226656" y="1473071"/>
+            <a:ext cx="7801728" cy="5113739"/>
+          </a:xfrm>
+        </p:spPr>
+      </p:pic>
+    </p:spTree>
+    <p:extLst>
+      <p:ext uri="{BB962C8B-B14F-4D97-AF65-F5344CB8AC3E}">
+        <p14:creationId xmlns:p14="http://schemas.microsoft.com/office/powerpoint/2010/main" val="1934192974"/>
+      </p:ext>
+    </p:extLst>
+  </p:cSld>
+  <p:clrMapOvr>
+    <a:masterClrMapping/>
+  </p:clrMapOvr>
+</p:sld>
+</file>
+
+<file path=ppt/slides/slide24.xml><?xml version="1.0" encoding="utf-8"?>
+<p:sld xmlns:a="http://schemas.openxmlformats.org/drawingml/2006/main" xmlns:r="http://schemas.openxmlformats.org/officeDocument/2006/relationships" xmlns:p="http://schemas.openxmlformats.org/presentationml/2006/main">
+  <p:cSld>
+    <p:spTree>
+      <p:nvGrpSpPr>
+        <p:cNvPr id="1" name=""/>
+        <p:cNvGrpSpPr/>
+        <p:nvPr/>
+      </p:nvGrpSpPr>
+      <p:grpSpPr>
+        <a:xfrm>
+          <a:off x="0" y="0"/>
+          <a:ext cx="0" cy="0"/>
+          <a:chOff x="0" y="0"/>
+          <a:chExt cx="0" cy="0"/>
+        </a:xfrm>
+      </p:grpSpPr>
+      <p:sp>
+        <p:nvSpPr>
+          <p:cNvPr id="2" name="Title 1"/>
+          <p:cNvSpPr>
+            <a:spLocks noGrp="1"/>
+          </p:cNvSpPr>
+          <p:nvPr>
+            <p:ph type="title"/>
+          </p:nvPr>
+        </p:nvSpPr>
+        <p:spPr/>
+        <p:txBody>
+          <a:bodyPr/>
+          <a:lstStyle/>
+          <a:p>
+            <a:pPr eaLnBrk="1" fontAlgn="auto" hangingPunct="1">
+              <a:spcAft>
+                <a:spcPts val="0"/>
+              </a:spcAft>
               <a:defRPr/>
             </a:pPr>
-            <a:fld id="{741C5E92-FA1C-4FE0-B04D-D55D650617C7}" type="slidenum">
-              <a:rPr lang="en-US"/>
-              <a:pPr>
-                <a:defRPr/>
-              </a:pPr>
-              <a:t>2</a:t>
-            </a:fld>
+            <a:r>
+              <a:rPr lang="bg-BG" dirty="0">
+                <a:solidFill>
+                  <a:schemeClr val="accent1">
+                    <a:tint val="88000"/>
+                    <a:satMod val="150000"/>
+                  </a:schemeClr>
+                </a:solidFill>
+              </a:rPr>
+              <a:t>Бъдещи насоки за развитие</a:t>
+            </a:r>
             <a:endParaRPr lang="en-US" dirty="0">
               <a:solidFill>
-                <a:srgbClr val="FFFFFF"/>
+                <a:schemeClr val="accent1">
+                  <a:tint val="88000"/>
+                  <a:satMod val="150000"/>
+                </a:schemeClr>
               </a:solidFill>
             </a:endParaRPr>
+          </a:p>
+        </p:txBody>
+      </p:sp>
+      <p:sp>
+        <p:nvSpPr>
+          <p:cNvPr id="25602" name="Content Placeholder 2"/>
+          <p:cNvSpPr>
+            <a:spLocks noGrp="1"/>
+          </p:cNvSpPr>
+          <p:nvPr>
+            <p:ph idx="1"/>
+          </p:nvPr>
+        </p:nvSpPr>
+        <p:spPr>
+          <a:xfrm>
+            <a:off x="609599" y="1488613"/>
+            <a:ext cx="6347714" cy="3880773"/>
+          </a:xfrm>
+        </p:spPr>
+        <p:txBody>
+          <a:bodyPr>
+            <a:normAutofit/>
+          </a:bodyPr>
+          <a:lstStyle/>
+          <a:p>
+            <a:pPr eaLnBrk="1" hangingPunct="1"/>
+            <a:r>
+              <a:rPr lang="bg-BG" sz="2400" dirty="0"/>
+              <a:t>Анализ на резултатите</a:t>
+            </a:r>
+            <a:endParaRPr lang="en-US" sz="2400" dirty="0"/>
+          </a:p>
+          <a:p>
+            <a:pPr eaLnBrk="1" hangingPunct="1"/>
+            <a:r>
+              <a:rPr lang="bg-BG" sz="2400" dirty="0"/>
+              <a:t>Бъдещи насоки за развитие</a:t>
+            </a:r>
+            <a:endParaRPr lang="en-US" sz="2400" dirty="0"/>
+          </a:p>
+        </p:txBody>
+      </p:sp>
+    </p:spTree>
+  </p:cSld>
+  <p:clrMapOvr>
+    <a:masterClrMapping/>
+  </p:clrMapOvr>
+</p:sld>
+</file>
+
+<file path=ppt/slides/slide25.xml><?xml version="1.0" encoding="utf-8"?>
+<p:sld xmlns:a="http://schemas.openxmlformats.org/drawingml/2006/main" xmlns:r="http://schemas.openxmlformats.org/officeDocument/2006/relationships" xmlns:p="http://schemas.openxmlformats.org/presentationml/2006/main">
+  <p:cSld>
+    <p:spTree>
+      <p:nvGrpSpPr>
+        <p:cNvPr id="1" name=""/>
+        <p:cNvGrpSpPr/>
+        <p:nvPr/>
+      </p:nvGrpSpPr>
+      <p:grpSpPr>
+        <a:xfrm>
+          <a:off x="0" y="0"/>
+          <a:ext cx="0" cy="0"/>
+          <a:chOff x="0" y="0"/>
+          <a:chExt cx="0" cy="0"/>
+        </a:xfrm>
+      </p:grpSpPr>
+      <p:sp>
+        <p:nvSpPr>
+          <p:cNvPr id="2" name="Title 1"/>
+          <p:cNvSpPr>
+            <a:spLocks noGrp="1"/>
+          </p:cNvSpPr>
+          <p:nvPr>
+            <p:ph type="title"/>
+          </p:nvPr>
+        </p:nvSpPr>
+        <p:spPr/>
+        <p:txBody>
+          <a:bodyPr/>
+          <a:lstStyle/>
+          <a:p>
+            <a:pPr eaLnBrk="1" fontAlgn="auto" hangingPunct="1">
+              <a:spcAft>
+                <a:spcPts val="0"/>
+              </a:spcAft>
+              <a:defRPr/>
+            </a:pPr>
+            <a:r>
+              <a:rPr lang="bg-BG" dirty="0"/>
+              <a:t>Въпроси</a:t>
+            </a:r>
+            <a:endParaRPr lang="en-US" dirty="0"/>
           </a:p>
         </p:txBody>
       </p:sp>
@@ -8357,67 +8669,6 @@
           </a:p>
         </p:txBody>
       </p:sp>
-      <p:sp>
-        <p:nvSpPr>
-          <p:cNvPr id="4" name="Footer Placeholder 3"/>
-          <p:cNvSpPr>
-            <a:spLocks noGrp="1"/>
-          </p:cNvSpPr>
-          <p:nvPr>
-            <p:ph type="ftr" sz="quarter" idx="11"/>
-          </p:nvPr>
-        </p:nvSpPr>
-        <p:spPr/>
-        <p:txBody>
-          <a:bodyPr/>
-          <a:lstStyle/>
-          <a:p>
-            <a:pPr>
-              <a:defRPr/>
-            </a:pPr>
-            <a:r>
-              <a:rPr lang="bg-BG" dirty="0"/>
-              <a:t>Анализ на софтуерните изисквания</a:t>
-            </a:r>
-            <a:endParaRPr lang="en-US" dirty="0"/>
-          </a:p>
-        </p:txBody>
-      </p:sp>
-      <p:sp>
-        <p:nvSpPr>
-          <p:cNvPr id="5" name="Slide Number Placeholder 4"/>
-          <p:cNvSpPr>
-            <a:spLocks noGrp="1"/>
-          </p:cNvSpPr>
-          <p:nvPr>
-            <p:ph type="sldNum" sz="quarter" idx="12"/>
-          </p:nvPr>
-        </p:nvSpPr>
-        <p:spPr/>
-        <p:txBody>
-          <a:bodyPr>
-            <a:normAutofit/>
-          </a:bodyPr>
-          <a:lstStyle/>
-          <a:p>
-            <a:pPr>
-              <a:defRPr/>
-            </a:pPr>
-            <a:fld id="{57F3CA82-8CA0-4E79-893A-506B5A42D588}" type="slidenum">
-              <a:rPr lang="en-US"/>
-              <a:pPr>
-                <a:defRPr/>
-              </a:pPr>
-              <a:t>3</a:t>
-            </a:fld>
-            <a:endParaRPr lang="en-US" dirty="0">
-              <a:solidFill>
-                <a:srgbClr val="FFFFFF"/>
-              </a:solidFill>
-            </a:endParaRPr>
-          </a:p>
-        </p:txBody>
-      </p:sp>
     </p:spTree>
   </p:cSld>
   <p:clrMapOvr>
@@ -8586,70 +8837,6 @@
           </a:p>
         </p:txBody>
       </p:sp>
-      <p:sp>
-        <p:nvSpPr>
-          <p:cNvPr id="5" name="Footer Placeholder 4"/>
-          <p:cNvSpPr>
-            <a:spLocks noGrp="1"/>
-          </p:cNvSpPr>
-          <p:nvPr>
-            <p:ph type="ftr" sz="quarter" idx="11"/>
-          </p:nvPr>
-        </p:nvSpPr>
-        <p:spPr>
-          <a:xfrm>
-            <a:off x="862639" y="6303963"/>
-            <a:ext cx="4622973" cy="365125"/>
-          </a:xfrm>
-        </p:spPr>
-        <p:txBody>
-          <a:bodyPr/>
-          <a:lstStyle/>
-          <a:p>
-            <a:pPr>
-              <a:defRPr/>
-            </a:pPr>
-            <a:r>
-              <a:rPr lang="bg-BG" dirty="0"/>
-              <a:t>Анализ на софтуерните изисквания</a:t>
-            </a:r>
-            <a:endParaRPr lang="en-US" dirty="0"/>
-          </a:p>
-        </p:txBody>
-      </p:sp>
-      <p:sp>
-        <p:nvSpPr>
-          <p:cNvPr id="6" name="Slide Number Placeholder 5"/>
-          <p:cNvSpPr>
-            <a:spLocks noGrp="1"/>
-          </p:cNvSpPr>
-          <p:nvPr>
-            <p:ph type="sldNum" sz="quarter" idx="12"/>
-          </p:nvPr>
-        </p:nvSpPr>
-        <p:spPr/>
-        <p:txBody>
-          <a:bodyPr/>
-          <a:lstStyle/>
-          <a:p>
-            <a:pPr>
-              <a:defRPr/>
-            </a:pPr>
-            <a:fld id="{01C3A269-7F64-438B-B20F-1BA53DF959AB}" type="slidenum">
-              <a:rPr lang="en-US"/>
-              <a:pPr>
-                <a:defRPr/>
-              </a:pPr>
-              <a:t>4</a:t>
-            </a:fld>
-            <a:endParaRPr lang="en-US" dirty="0">
-              <a:solidFill>
-                <a:srgbClr val="FFFFFF"/>
-              </a:solidFill>
-            </a:endParaRPr>
-          </a:p>
-        </p:txBody>
-      </p:sp>
     </p:spTree>
   </p:cSld>
   <p:clrMapOvr>
@@ -8740,134 +8927,75 @@
           <a:p>
             <a:pPr eaLnBrk="1" hangingPunct="1"/>
             <a:r>
-              <a:rPr lang="bg-BG"/>
+              <a:rPr lang="bg-BG" dirty="0"/>
               <a:t>Профил на заинтересовните лица </a:t>
             </a:r>
           </a:p>
           <a:p>
             <a:pPr lvl="1" eaLnBrk="1" hangingPunct="1"/>
             <a:r>
-              <a:rPr lang="bg-BG"/>
+              <a:rPr lang="bg-BG" dirty="0"/>
               <a:t>Организация (ако има такава)</a:t>
             </a:r>
           </a:p>
           <a:p>
             <a:pPr lvl="1" eaLnBrk="1" hangingPunct="1"/>
             <a:r>
-              <a:rPr lang="bg-BG"/>
+              <a:rPr lang="bg-BG" dirty="0"/>
               <a:t>Кои са?</a:t>
             </a:r>
           </a:p>
           <a:p>
             <a:pPr lvl="1" eaLnBrk="1" hangingPunct="1"/>
             <a:r>
-              <a:rPr lang="bg-BG"/>
+              <a:rPr lang="bg-BG" dirty="0"/>
               <a:t>Каква е връзката им със системата (преки потребители или други)</a:t>
             </a:r>
           </a:p>
           <a:p>
             <a:pPr lvl="1" eaLnBrk="1" hangingPunct="1"/>
             <a:r>
-              <a:rPr lang="bg-BG"/>
+              <a:rPr lang="bg-BG" dirty="0"/>
               <a:t>Защо сте ги избрали? </a:t>
             </a:r>
-            <a:endParaRPr lang="en-US"/>
+            <a:endParaRPr lang="en-US" dirty="0"/>
           </a:p>
           <a:p>
             <a:pPr eaLnBrk="1" hangingPunct="1"/>
             <a:r>
-              <a:rPr lang="bg-BG"/>
+              <a:rPr lang="bg-BG" dirty="0"/>
               <a:t>Подход</a:t>
             </a:r>
           </a:p>
           <a:p>
             <a:pPr lvl="1" eaLnBrk="1" hangingPunct="1"/>
             <a:r>
-              <a:rPr lang="bg-BG"/>
+              <a:rPr lang="bg-BG" dirty="0"/>
               <a:t>„</a:t>
             </a:r>
             <a:r>
-              <a:rPr lang="en-US"/>
+              <a:rPr lang="en-US" dirty="0"/>
               <a:t>Face to Face</a:t>
             </a:r>
             <a:r>
-              <a:rPr lang="bg-BG"/>
+              <a:rPr lang="bg-BG" dirty="0"/>
               <a:t>“ интервю</a:t>
             </a:r>
-            <a:endParaRPr lang="en-US"/>
+            <a:endParaRPr lang="en-US" dirty="0"/>
           </a:p>
           <a:p>
             <a:pPr lvl="1" eaLnBrk="1" hangingPunct="1"/>
             <a:r>
-              <a:rPr lang="bg-BG"/>
+              <a:rPr lang="bg-BG" dirty="0"/>
               <a:t>Анкети</a:t>
             </a:r>
           </a:p>
           <a:p>
             <a:pPr eaLnBrk="1" hangingPunct="1"/>
             <a:r>
-              <a:rPr lang="bg-BG"/>
+              <a:rPr lang="bg-BG" dirty="0"/>
               <a:t>Въпросници</a:t>
             </a:r>
-          </a:p>
-        </p:txBody>
-      </p:sp>
-      <p:sp>
-        <p:nvSpPr>
-          <p:cNvPr id="5" name="Footer Placeholder 4"/>
-          <p:cNvSpPr>
-            <a:spLocks noGrp="1"/>
-          </p:cNvSpPr>
-          <p:nvPr>
-            <p:ph type="ftr" sz="quarter" idx="11"/>
-          </p:nvPr>
-        </p:nvSpPr>
-        <p:spPr/>
-        <p:txBody>
-          <a:bodyPr/>
-          <a:lstStyle/>
-          <a:p>
-            <a:pPr>
-              <a:defRPr/>
-            </a:pPr>
-            <a:r>
-              <a:rPr lang="bg-BG"/>
-              <a:t>Анализ на софтуерните изисквания</a:t>
-            </a:r>
-            <a:endParaRPr lang="en-US"/>
-          </a:p>
-        </p:txBody>
-      </p:sp>
-      <p:sp>
-        <p:nvSpPr>
-          <p:cNvPr id="6" name="Slide Number Placeholder 5"/>
-          <p:cNvSpPr>
-            <a:spLocks noGrp="1"/>
-          </p:cNvSpPr>
-          <p:nvPr>
-            <p:ph type="sldNum" sz="quarter" idx="12"/>
-          </p:nvPr>
-        </p:nvSpPr>
-        <p:spPr/>
-        <p:txBody>
-          <a:bodyPr/>
-          <a:lstStyle/>
-          <a:p>
-            <a:pPr>
-              <a:defRPr/>
-            </a:pPr>
-            <a:fld id="{2522EC0A-3402-4481-A8F4-8AB858BA8CE0}" type="slidenum">
-              <a:rPr lang="en-US"/>
-              <a:pPr>
-                <a:defRPr/>
-              </a:pPr>
-              <a:t>5</a:t>
-            </a:fld>
-            <a:endParaRPr lang="en-US" dirty="0">
-              <a:solidFill>
-                <a:srgbClr val="FFFFFF"/>
-              </a:solidFill>
-            </a:endParaRPr>
           </a:p>
         </p:txBody>
       </p:sp>
@@ -8992,67 +9120,6 @@
           </a:p>
         </p:txBody>
       </p:sp>
-      <p:sp>
-        <p:nvSpPr>
-          <p:cNvPr id="4" name="Footer Placeholder 3"/>
-          <p:cNvSpPr>
-            <a:spLocks noGrp="1"/>
-          </p:cNvSpPr>
-          <p:nvPr>
-            <p:ph type="ftr" sz="quarter" idx="11"/>
-          </p:nvPr>
-        </p:nvSpPr>
-        <p:spPr/>
-        <p:txBody>
-          <a:bodyPr/>
-          <a:lstStyle/>
-          <a:p>
-            <a:pPr>
-              <a:defRPr/>
-            </a:pPr>
-            <a:r>
-              <a:rPr lang="bg-BG"/>
-              <a:t>Анализ на софтуерните изисквания</a:t>
-            </a:r>
-            <a:endParaRPr lang="en-US"/>
-          </a:p>
-        </p:txBody>
-      </p:sp>
-      <p:sp>
-        <p:nvSpPr>
-          <p:cNvPr id="5" name="Slide Number Placeholder 4"/>
-          <p:cNvSpPr>
-            <a:spLocks noGrp="1"/>
-          </p:cNvSpPr>
-          <p:nvPr>
-            <p:ph type="sldNum" sz="quarter" idx="12"/>
-          </p:nvPr>
-        </p:nvSpPr>
-        <p:spPr/>
-        <p:txBody>
-          <a:bodyPr>
-            <a:normAutofit/>
-          </a:bodyPr>
-          <a:lstStyle/>
-          <a:p>
-            <a:pPr>
-              <a:defRPr/>
-            </a:pPr>
-            <a:fld id="{D1DDFF2C-5117-436C-BC5A-33A315228DAD}" type="slidenum">
-              <a:rPr lang="en-US"/>
-              <a:pPr>
-                <a:defRPr/>
-              </a:pPr>
-              <a:t>6</a:t>
-            </a:fld>
-            <a:endParaRPr lang="en-US" dirty="0">
-              <a:solidFill>
-                <a:srgbClr val="FFFFFF"/>
-              </a:solidFill>
-            </a:endParaRPr>
-          </a:p>
-        </p:txBody>
-      </p:sp>
     </p:spTree>
   </p:cSld>
   <p:clrMapOvr>
@@ -9164,109 +9231,6 @@
               <a:rPr lang="en-US" dirty="0"/>
               <a:t>The Restaurant manager should be able to view information about all reservations as well as select specific reservations.</a:t>
             </a:r>
-          </a:p>
-        </p:txBody>
-      </p:sp>
-      <p:sp>
-        <p:nvSpPr>
-          <p:cNvPr id="4" name="Date Placeholder 3">
-            <a:extLst>
-              <a:ext uri="{FF2B5EF4-FFF2-40B4-BE49-F238E27FC236}">
-                <a16:creationId xmlns:a16="http://schemas.microsoft.com/office/drawing/2014/main" id="{8BB64357-AE6C-4481-8C49-4B912649AEF9}"/>
-              </a:ext>
-            </a:extLst>
-          </p:cNvPr>
-          <p:cNvSpPr>
-            <a:spLocks noGrp="1"/>
-          </p:cNvSpPr>
-          <p:nvPr>
-            <p:ph type="dt" sz="half" idx="10"/>
-          </p:nvPr>
-        </p:nvSpPr>
-        <p:spPr/>
-        <p:txBody>
-          <a:bodyPr/>
-          <a:lstStyle/>
-          <a:p>
-            <a:pPr>
-              <a:defRPr/>
-            </a:pPr>
-            <a:r>
-              <a:rPr lang="en-US"/>
-              <a:t>2013</a:t>
-            </a:r>
-            <a:endParaRPr lang="en-US" dirty="0"/>
-          </a:p>
-        </p:txBody>
-      </p:sp>
-      <p:sp>
-        <p:nvSpPr>
-          <p:cNvPr id="5" name="Footer Placeholder 4">
-            <a:extLst>
-              <a:ext uri="{FF2B5EF4-FFF2-40B4-BE49-F238E27FC236}">
-                <a16:creationId xmlns:a16="http://schemas.microsoft.com/office/drawing/2014/main" id="{7BB9169C-85D2-4B9D-B3C9-CBA98BD93DE5}"/>
-              </a:ext>
-            </a:extLst>
-          </p:cNvPr>
-          <p:cNvSpPr>
-            <a:spLocks noGrp="1"/>
-          </p:cNvSpPr>
-          <p:nvPr>
-            <p:ph type="ftr" sz="quarter" idx="11"/>
-          </p:nvPr>
-        </p:nvSpPr>
-        <p:spPr/>
-        <p:txBody>
-          <a:bodyPr/>
-          <a:lstStyle/>
-          <a:p>
-            <a:pPr>
-              <a:defRPr/>
-            </a:pPr>
-            <a:r>
-              <a:rPr lang="bg-BG"/>
-              <a:t>Анализ на софтуерните изисквания</a:t>
-            </a:r>
-            <a:endParaRPr lang="en-US"/>
-          </a:p>
-        </p:txBody>
-      </p:sp>
-      <p:sp>
-        <p:nvSpPr>
-          <p:cNvPr id="6" name="Slide Number Placeholder 5">
-            <a:extLst>
-              <a:ext uri="{FF2B5EF4-FFF2-40B4-BE49-F238E27FC236}">
-                <a16:creationId xmlns:a16="http://schemas.microsoft.com/office/drawing/2014/main" id="{023B4A5A-8BF3-42D7-B39E-EF594C021698}"/>
-              </a:ext>
-            </a:extLst>
-          </p:cNvPr>
-          <p:cNvSpPr>
-            <a:spLocks noGrp="1"/>
-          </p:cNvSpPr>
-          <p:nvPr>
-            <p:ph type="sldNum" sz="quarter" idx="12"/>
-          </p:nvPr>
-        </p:nvSpPr>
-        <p:spPr/>
-        <p:txBody>
-          <a:bodyPr/>
-          <a:lstStyle/>
-          <a:p>
-            <a:pPr>
-              <a:defRPr/>
-            </a:pPr>
-            <a:fld id="{2F34750C-19EA-428D-8F45-3D39E0788C18}" type="slidenum">
-              <a:rPr lang="en-US" smtClean="0"/>
-              <a:pPr>
-                <a:defRPr/>
-              </a:pPr>
-              <a:t>7</a:t>
-            </a:fld>
-            <a:endParaRPr lang="en-US" dirty="0">
-              <a:solidFill>
-                <a:srgbClr val="FFFFFF"/>
-              </a:solidFill>
-            </a:endParaRPr>
           </a:p>
         </p:txBody>
       </p:sp>
@@ -9432,41 +9396,6 @@
           </a:p>
         </p:txBody>
       </p:sp>
-      <p:sp>
-        <p:nvSpPr>
-          <p:cNvPr id="5" name="Slide Number Placeholder 4"/>
-          <p:cNvSpPr>
-            <a:spLocks noGrp="1"/>
-          </p:cNvSpPr>
-          <p:nvPr>
-            <p:ph type="sldNum" sz="quarter" idx="12"/>
-          </p:nvPr>
-        </p:nvSpPr>
-        <p:spPr/>
-        <p:txBody>
-          <a:bodyPr>
-            <a:normAutofit/>
-          </a:bodyPr>
-          <a:lstStyle/>
-          <a:p>
-            <a:pPr>
-              <a:defRPr/>
-            </a:pPr>
-            <a:fld id="{45EDD76A-C4C2-431E-ACC8-C826EEE91060}" type="slidenum">
-              <a:rPr lang="en-US"/>
-              <a:pPr>
-                <a:defRPr/>
-              </a:pPr>
-              <a:t>8</a:t>
-            </a:fld>
-            <a:endParaRPr lang="en-US" dirty="0">
-              <a:solidFill>
-                <a:srgbClr val="FFFFFF"/>
-              </a:solidFill>
-            </a:endParaRPr>
-          </a:p>
-        </p:txBody>
-      </p:sp>
     </p:spTree>
   </p:cSld>
   <p:clrMapOvr>
@@ -9591,109 +9520,6 @@
           </a:p>
           <a:p>
             <a:endParaRPr lang="bg-BG" dirty="0"/>
-          </a:p>
-        </p:txBody>
-      </p:sp>
-      <p:sp>
-        <p:nvSpPr>
-          <p:cNvPr id="4" name="Date Placeholder 3">
-            <a:extLst>
-              <a:ext uri="{FF2B5EF4-FFF2-40B4-BE49-F238E27FC236}">
-                <a16:creationId xmlns:a16="http://schemas.microsoft.com/office/drawing/2014/main" id="{CD47632F-202B-4230-906D-DC7AE3194F68}"/>
-              </a:ext>
-            </a:extLst>
-          </p:cNvPr>
-          <p:cNvSpPr>
-            <a:spLocks noGrp="1"/>
-          </p:cNvSpPr>
-          <p:nvPr>
-            <p:ph type="dt" sz="half" idx="10"/>
-          </p:nvPr>
-        </p:nvSpPr>
-        <p:spPr/>
-        <p:txBody>
-          <a:bodyPr/>
-          <a:lstStyle/>
-          <a:p>
-            <a:pPr>
-              <a:defRPr/>
-            </a:pPr>
-            <a:r>
-              <a:rPr lang="en-US"/>
-              <a:t>2013</a:t>
-            </a:r>
-            <a:endParaRPr lang="en-US" dirty="0"/>
-          </a:p>
-        </p:txBody>
-      </p:sp>
-      <p:sp>
-        <p:nvSpPr>
-          <p:cNvPr id="5" name="Footer Placeholder 4">
-            <a:extLst>
-              <a:ext uri="{FF2B5EF4-FFF2-40B4-BE49-F238E27FC236}">
-                <a16:creationId xmlns:a16="http://schemas.microsoft.com/office/drawing/2014/main" id="{5345111B-7B40-430A-897D-348E3E97AA81}"/>
-              </a:ext>
-            </a:extLst>
-          </p:cNvPr>
-          <p:cNvSpPr>
-            <a:spLocks noGrp="1"/>
-          </p:cNvSpPr>
-          <p:nvPr>
-            <p:ph type="ftr" sz="quarter" idx="11"/>
-          </p:nvPr>
-        </p:nvSpPr>
-        <p:spPr/>
-        <p:txBody>
-          <a:bodyPr/>
-          <a:lstStyle/>
-          <a:p>
-            <a:pPr>
-              <a:defRPr/>
-            </a:pPr>
-            <a:r>
-              <a:rPr lang="bg-BG"/>
-              <a:t>Анализ на софтуерните изисквания</a:t>
-            </a:r>
-            <a:endParaRPr lang="en-US"/>
-          </a:p>
-        </p:txBody>
-      </p:sp>
-      <p:sp>
-        <p:nvSpPr>
-          <p:cNvPr id="6" name="Slide Number Placeholder 5">
-            <a:extLst>
-              <a:ext uri="{FF2B5EF4-FFF2-40B4-BE49-F238E27FC236}">
-                <a16:creationId xmlns:a16="http://schemas.microsoft.com/office/drawing/2014/main" id="{2A0F5B8F-AF37-4104-B8EA-F8DB7226584A}"/>
-              </a:ext>
-            </a:extLst>
-          </p:cNvPr>
-          <p:cNvSpPr>
-            <a:spLocks noGrp="1"/>
-          </p:cNvSpPr>
-          <p:nvPr>
-            <p:ph type="sldNum" sz="quarter" idx="12"/>
-          </p:nvPr>
-        </p:nvSpPr>
-        <p:spPr/>
-        <p:txBody>
-          <a:bodyPr/>
-          <a:lstStyle/>
-          <a:p>
-            <a:pPr>
-              <a:defRPr/>
-            </a:pPr>
-            <a:fld id="{2F34750C-19EA-428D-8F45-3D39E0788C18}" type="slidenum">
-              <a:rPr lang="en-US" smtClean="0"/>
-              <a:pPr>
-                <a:defRPr/>
-              </a:pPr>
-              <a:t>9</a:t>
-            </a:fld>
-            <a:endParaRPr lang="en-US" dirty="0">
-              <a:solidFill>
-                <a:srgbClr val="FFFFFF"/>
-              </a:solidFill>
-            </a:endParaRPr>
           </a:p>
         </p:txBody>
       </p:sp>

</xml_diff>

<commit_message>
Finish document and presentation
</commit_message>
<xml_diff>
--- a/rezervito-hw-05/Rezervito_Presentation_62121_62151_62167.pptx
+++ b/rezervito-hw-05/Rezervito_Presentation_62121_62151_62167.pptx
@@ -8763,77 +8763,25 @@
           <a:p>
             <a:pPr eaLnBrk="1" hangingPunct="1"/>
             <a:r>
-              <a:rPr lang="bg-BG" sz="2400" dirty="0"/>
-              <a:t>Проучване на състоянието в областта (</a:t>
-            </a:r>
-            <a:r>
-              <a:rPr lang="en-US" sz="2400" dirty="0"/>
-              <a:t>State of the Art</a:t>
-            </a:r>
-            <a:r>
-              <a:rPr lang="bg-BG" sz="2400" dirty="0"/>
-              <a:t>)</a:t>
-            </a:r>
-            <a:endParaRPr lang="en-US" sz="2400" dirty="0"/>
-          </a:p>
-          <a:p>
-            <a:pPr lvl="1" eaLnBrk="1" hangingPunct="1"/>
-            <a:r>
-              <a:rPr lang="bg-BG" sz="2000" dirty="0"/>
-              <a:t>Разгледани други подобни системи и/или</a:t>
-            </a:r>
-          </a:p>
-          <a:p>
-            <a:pPr lvl="1" eaLnBrk="1" hangingPunct="1"/>
-            <a:r>
-              <a:rPr lang="bg-BG" sz="2000" dirty="0"/>
-              <a:t>Проучване за осъществимост (</a:t>
-            </a:r>
-            <a:r>
-              <a:rPr lang="en-US" sz="2000" dirty="0"/>
-              <a:t>feasibility study</a:t>
-            </a:r>
-            <a:r>
-              <a:rPr lang="bg-BG" sz="2000" dirty="0"/>
-              <a:t>) от гледна точка на технологии и/или</a:t>
-            </a:r>
-            <a:endParaRPr lang="en-US" sz="2000" dirty="0"/>
-          </a:p>
-          <a:p>
-            <a:pPr lvl="1" eaLnBrk="1" hangingPunct="1"/>
-            <a:r>
-              <a:rPr lang="bg-BG" sz="2000" dirty="0"/>
-              <a:t>Проучване на пазара</a:t>
-            </a:r>
+              <a:rPr lang="bg-BG" sz="2800" dirty="0"/>
+              <a:t>Проучване на състоянието в областта</a:t>
+            </a:r>
+            <a:endParaRPr lang="en-US" sz="2800" dirty="0"/>
           </a:p>
           <a:p>
             <a:pPr eaLnBrk="1" hangingPunct="1"/>
             <a:r>
-              <a:rPr lang="bg-BG" sz="2400" dirty="0"/>
+              <a:rPr lang="bg-BG" sz="2800" dirty="0"/>
               <a:t>Брейнсторминг</a:t>
             </a:r>
           </a:p>
           <a:p>
             <a:pPr eaLnBrk="1" hangingPunct="1"/>
             <a:r>
-              <a:rPr lang="bg-BG" sz="2400" dirty="0"/>
+              <a:rPr lang="bg-BG" sz="2800" dirty="0"/>
               <a:t>Интервюта</a:t>
             </a:r>
-          </a:p>
-          <a:p>
-            <a:pPr eaLnBrk="1" hangingPunct="1"/>
-            <a:r>
-              <a:rPr lang="bg-BG" sz="2400" dirty="0"/>
-              <a:t>Работни срещи</a:t>
-            </a:r>
-          </a:p>
-          <a:p>
-            <a:pPr eaLnBrk="1" hangingPunct="1"/>
-            <a:r>
-              <a:rPr lang="bg-BG" sz="2400" dirty="0"/>
-              <a:t>Етнография (наблюдение)</a:t>
-            </a:r>
-            <a:endParaRPr lang="en-US" sz="2400" dirty="0"/>
+            <a:endParaRPr lang="en-US" sz="2800" dirty="0"/>
           </a:p>
         </p:txBody>
       </p:sp>
@@ -8922,79 +8870,26 @@
           </a:xfrm>
         </p:spPr>
         <p:txBody>
-          <a:bodyPr/>
+          <a:bodyPr>
+            <a:normAutofit/>
+          </a:bodyPr>
           <a:lstStyle/>
           <a:p>
-            <a:pPr eaLnBrk="1" hangingPunct="1"/>
-            <a:r>
-              <a:rPr lang="bg-BG" dirty="0"/>
-              <a:t>Профил на заинтересовните лица </a:t>
-            </a:r>
-          </a:p>
-          <a:p>
-            <a:pPr lvl="1" eaLnBrk="1" hangingPunct="1"/>
-            <a:r>
-              <a:rPr lang="bg-BG" dirty="0"/>
-              <a:t>Организация (ако има такава)</a:t>
-            </a:r>
-          </a:p>
-          <a:p>
-            <a:pPr lvl="1" eaLnBrk="1" hangingPunct="1"/>
-            <a:r>
-              <a:rPr lang="bg-BG" dirty="0"/>
-              <a:t>Кои са?</a:t>
-            </a:r>
-          </a:p>
-          <a:p>
-            <a:pPr lvl="1" eaLnBrk="1" hangingPunct="1"/>
-            <a:r>
-              <a:rPr lang="bg-BG" dirty="0"/>
-              <a:t>Каква е връзката им със системата (преки потребители или други)</a:t>
-            </a:r>
-          </a:p>
-          <a:p>
-            <a:pPr lvl="1" eaLnBrk="1" hangingPunct="1"/>
-            <a:r>
-              <a:rPr lang="bg-BG" dirty="0"/>
-              <a:t>Защо сте ги избрали? </a:t>
-            </a:r>
-            <a:endParaRPr lang="en-US" dirty="0"/>
-          </a:p>
-          <a:p>
-            <a:pPr eaLnBrk="1" hangingPunct="1"/>
-            <a:r>
-              <a:rPr lang="bg-BG" dirty="0"/>
-              <a:t>Подход</a:t>
-            </a:r>
-          </a:p>
-          <a:p>
-            <a:pPr lvl="1" eaLnBrk="1" hangingPunct="1"/>
-            <a:r>
-              <a:rPr lang="bg-BG" dirty="0"/>
-              <a:t>„</a:t>
-            </a:r>
-            <a:r>
-              <a:rPr lang="en-US" dirty="0"/>
-              <a:t>Face to Face</a:t>
-            </a:r>
-            <a:r>
-              <a:rPr lang="bg-BG" dirty="0"/>
-              <a:t>“ интервю</a:t>
-            </a:r>
-            <a:endParaRPr lang="en-US" dirty="0"/>
-          </a:p>
-          <a:p>
-            <a:pPr lvl="1" eaLnBrk="1" hangingPunct="1"/>
-            <a:r>
-              <a:rPr lang="bg-BG" dirty="0"/>
-              <a:t>Анкети</a:t>
-            </a:r>
-          </a:p>
-          <a:p>
-            <a:pPr eaLnBrk="1" hangingPunct="1"/>
-            <a:r>
-              <a:rPr lang="bg-BG" dirty="0"/>
-              <a:t>Въпросници</a:t>
+            <a:r>
+              <a:rPr lang="bg-BG" sz="3000" dirty="0"/>
+              <a:t>Интервю с крайни потребители</a:t>
+            </a:r>
+          </a:p>
+          <a:p>
+            <a:r>
+              <a:rPr lang="bg-BG" sz="3000" dirty="0"/>
+              <a:t>Интервю с управител на ресторант</a:t>
+            </a:r>
+          </a:p>
+          <a:p>
+            <a:r>
+              <a:rPr lang="bg-BG" sz="3000" dirty="0"/>
+              <a:t>Интервю с разработчиците </a:t>
             </a:r>
           </a:p>
         </p:txBody>

</xml_diff>

<commit_message>
Add traceability matrix in document and do final revision
</commit_message>
<xml_diff>
--- a/rezervito-hw-05/Rezervito_Presentation_62121_62151_62167.pptx
+++ b/rezervito-hw-05/Rezervito_Presentation_62121_62151_62167.pptx
@@ -258,7 +258,7 @@
               <a:pPr>
                 <a:defRPr/>
               </a:pPr>
-              <a:t>28.5.2020 г.</a:t>
+              <a:t>29.5.2020 г.</a:t>
             </a:fld>
             <a:endParaRPr lang="bg-BG"/>
           </a:p>
@@ -7151,7 +7151,7 @@
           <p:cNvPr id="7" name="Content Placeholder 6">
             <a:extLst>
               <a:ext uri="{FF2B5EF4-FFF2-40B4-BE49-F238E27FC236}">
-                <a16:creationId xmlns:a16="http://schemas.microsoft.com/office/drawing/2014/main" xmlns="" id="{85C2E4D8-E11F-4F3F-B326-0136C4F09D2D}"/>
+                <a16:creationId xmlns:a16="http://schemas.microsoft.com/office/drawing/2014/main" id="{85C2E4D8-E11F-4F3F-B326-0136C4F09D2D}"/>
               </a:ext>
             </a:extLst>
           </p:cNvPr>
@@ -7214,7 +7214,7 @@
           <p:cNvPr id="7" name="Picture 6">
             <a:extLst>
               <a:ext uri="{FF2B5EF4-FFF2-40B4-BE49-F238E27FC236}">
-                <a16:creationId xmlns:a16="http://schemas.microsoft.com/office/drawing/2014/main" xmlns="" id="{3086A8DA-F814-4FF5-A35C-A989C64BE45C}"/>
+                <a16:creationId xmlns:a16="http://schemas.microsoft.com/office/drawing/2014/main" id="{3086A8DA-F814-4FF5-A35C-A989C64BE45C}"/>
               </a:ext>
             </a:extLst>
           </p:cNvPr>
@@ -7278,7 +7278,7 @@
           <p:cNvPr id="7" name="Picture 6">
             <a:extLst>
               <a:ext uri="{FF2B5EF4-FFF2-40B4-BE49-F238E27FC236}">
-                <a16:creationId xmlns:a16="http://schemas.microsoft.com/office/drawing/2014/main" xmlns="" id="{0C35E20D-2F46-40CF-A8C7-C4C795CC0FE8}"/>
+                <a16:creationId xmlns:a16="http://schemas.microsoft.com/office/drawing/2014/main" id="{0C35E20D-2F46-40CF-A8C7-C4C795CC0FE8}"/>
               </a:ext>
             </a:extLst>
           </p:cNvPr>
@@ -7342,7 +7342,7 @@
           <p:cNvPr id="7" name="Picture 6">
             <a:extLst>
               <a:ext uri="{FF2B5EF4-FFF2-40B4-BE49-F238E27FC236}">
-                <a16:creationId xmlns:a16="http://schemas.microsoft.com/office/drawing/2014/main" xmlns="" id="{2B1BFA99-1E45-48FD-BE57-DE357B2B7E1A}"/>
+                <a16:creationId xmlns:a16="http://schemas.microsoft.com/office/drawing/2014/main" id="{2B1BFA99-1E45-48FD-BE57-DE357B2B7E1A}"/>
               </a:ext>
             </a:extLst>
           </p:cNvPr>
@@ -7456,7 +7456,7 @@
           <p:cNvPr id="4" name="Content Placeholder 3">
             <a:extLst>
               <a:ext uri="{FF2B5EF4-FFF2-40B4-BE49-F238E27FC236}">
-                <a16:creationId xmlns:a16="http://schemas.microsoft.com/office/drawing/2014/main" xmlns="" id="{02EB7927-D663-4FC7-8479-6161D818B8F6}"/>
+                <a16:creationId xmlns:a16="http://schemas.microsoft.com/office/drawing/2014/main" id="{02EB7927-D663-4FC7-8479-6161D818B8F6}"/>
               </a:ext>
             </a:extLst>
           </p:cNvPr>
@@ -7516,7 +7516,7 @@
           <p:cNvPr id="8" name="Content Placeholder 7">
             <a:extLst>
               <a:ext uri="{FF2B5EF4-FFF2-40B4-BE49-F238E27FC236}">
-                <a16:creationId xmlns:a16="http://schemas.microsoft.com/office/drawing/2014/main" xmlns="" id="{6837D43B-0989-40E0-B1E2-996D1A4A214B}"/>
+                <a16:creationId xmlns:a16="http://schemas.microsoft.com/office/drawing/2014/main" id="{6837D43B-0989-40E0-B1E2-996D1A4A214B}"/>
               </a:ext>
             </a:extLst>
           </p:cNvPr>
@@ -7581,7 +7581,7 @@
           <p:cNvPr id="8" name="Content Placeholder 7">
             <a:extLst>
               <a:ext uri="{FF2B5EF4-FFF2-40B4-BE49-F238E27FC236}">
-                <a16:creationId xmlns:a16="http://schemas.microsoft.com/office/drawing/2014/main" xmlns="" id="{B9985FE6-DF2D-4616-9BDD-58776FFF3C4D}"/>
+                <a16:creationId xmlns:a16="http://schemas.microsoft.com/office/drawing/2014/main" id="{B9985FE6-DF2D-4616-9BDD-58776FFF3C4D}"/>
               </a:ext>
             </a:extLst>
           </p:cNvPr>
@@ -7691,7 +7691,7 @@
           <p:cNvPr id="9" name="Content Placeholder 8">
             <a:extLst>
               <a:ext uri="{FF2B5EF4-FFF2-40B4-BE49-F238E27FC236}">
-                <a16:creationId xmlns:a16="http://schemas.microsoft.com/office/drawing/2014/main" xmlns="" id="{F3EC3156-3A0A-4708-AC13-8EE46C7C8E6D}"/>
+                <a16:creationId xmlns:a16="http://schemas.microsoft.com/office/drawing/2014/main" id="{F3EC3156-3A0A-4708-AC13-8EE46C7C8E6D}"/>
               </a:ext>
             </a:extLst>
           </p:cNvPr>
@@ -7754,7 +7754,7 @@
           <p:cNvPr id="8" name="Content Placeholder 6">
             <a:extLst>
               <a:ext uri="{FF2B5EF4-FFF2-40B4-BE49-F238E27FC236}">
-                <a16:creationId xmlns:a16="http://schemas.microsoft.com/office/drawing/2014/main" xmlns="" id="{76546E0E-A791-43B3-B962-6BB1B0C1B72C}"/>
+                <a16:creationId xmlns:a16="http://schemas.microsoft.com/office/drawing/2014/main" id="{76546E0E-A791-43B3-B962-6BB1B0C1B72C}"/>
               </a:ext>
             </a:extLst>
           </p:cNvPr>
@@ -7822,7 +7822,7 @@
           <p:cNvPr id="7" name="Picture 6">
             <a:extLst>
               <a:ext uri="{FF2B5EF4-FFF2-40B4-BE49-F238E27FC236}">
-                <a16:creationId xmlns:a16="http://schemas.microsoft.com/office/drawing/2014/main" xmlns="" id="{C00D3495-50EA-47D4-8719-C0D232BA5856}"/>
+                <a16:creationId xmlns:a16="http://schemas.microsoft.com/office/drawing/2014/main" id="{C00D3495-50EA-47D4-8719-C0D232BA5856}"/>
               </a:ext>
             </a:extLst>
           </p:cNvPr>
@@ -8106,7 +8106,7 @@
           <p:cNvPr id="7" name="Picture 6">
             <a:extLst>
               <a:ext uri="{FF2B5EF4-FFF2-40B4-BE49-F238E27FC236}">
-                <a16:creationId xmlns:a16="http://schemas.microsoft.com/office/drawing/2014/main" xmlns="" id="{C66C75D8-C60A-477B-A29F-3C613D051BD4}"/>
+                <a16:creationId xmlns:a16="http://schemas.microsoft.com/office/drawing/2014/main" id="{C66C75D8-C60A-477B-A29F-3C613D051BD4}"/>
               </a:ext>
             </a:extLst>
           </p:cNvPr>
@@ -8170,7 +8170,7 @@
           <p:cNvPr id="2" name="Title 1">
             <a:extLst>
               <a:ext uri="{FF2B5EF4-FFF2-40B4-BE49-F238E27FC236}">
-                <a16:creationId xmlns:a16="http://schemas.microsoft.com/office/drawing/2014/main" xmlns="" id="{81A6B9A3-81A3-447A-AAEC-56E0730E41EB}"/>
+                <a16:creationId xmlns:a16="http://schemas.microsoft.com/office/drawing/2014/main" id="{81A6B9A3-81A3-447A-AAEC-56E0730E41EB}"/>
               </a:ext>
             </a:extLst>
           </p:cNvPr>
@@ -8215,7 +8215,7 @@
           <p:cNvPr id="8" name="Content Placeholder 7">
             <a:extLst>
               <a:ext uri="{FF2B5EF4-FFF2-40B4-BE49-F238E27FC236}">
-                <a16:creationId xmlns:a16="http://schemas.microsoft.com/office/drawing/2014/main" xmlns="" id="{1F8FE5A2-10A7-40D8-BB1F-5FB284546BCB}"/>
+                <a16:creationId xmlns:a16="http://schemas.microsoft.com/office/drawing/2014/main" id="{1F8FE5A2-10A7-40D8-BB1F-5FB284546BCB}"/>
               </a:ext>
             </a:extLst>
           </p:cNvPr>
@@ -8280,7 +8280,7 @@
           <p:cNvPr id="12" name="Content Placeholder 11">
             <a:extLst>
               <a:ext uri="{FF2B5EF4-FFF2-40B4-BE49-F238E27FC236}">
-                <a16:creationId xmlns:a16="http://schemas.microsoft.com/office/drawing/2014/main" xmlns="" id="{BF00D361-0362-4DC1-929B-1A6D35AAE976}"/>
+                <a16:creationId xmlns:a16="http://schemas.microsoft.com/office/drawing/2014/main" id="{BF00D361-0362-4DC1-929B-1A6D35AAE976}"/>
               </a:ext>
             </a:extLst>
           </p:cNvPr>
@@ -8345,7 +8345,7 @@
           <p:cNvPr id="2" name="Title 1">
             <a:extLst>
               <a:ext uri="{FF2B5EF4-FFF2-40B4-BE49-F238E27FC236}">
-                <a16:creationId xmlns:a16="http://schemas.microsoft.com/office/drawing/2014/main" xmlns="" id="{81A6B9A3-81A3-447A-AAEC-56E0730E41EB}"/>
+                <a16:creationId xmlns:a16="http://schemas.microsoft.com/office/drawing/2014/main" id="{81A6B9A3-81A3-447A-AAEC-56E0730E41EB}"/>
               </a:ext>
             </a:extLst>
           </p:cNvPr>
@@ -8381,7 +8381,7 @@
           <p:cNvPr id="8" name="Content Placeholder 7">
             <a:extLst>
               <a:ext uri="{FF2B5EF4-FFF2-40B4-BE49-F238E27FC236}">
-                <a16:creationId xmlns:a16="http://schemas.microsoft.com/office/drawing/2014/main" xmlns="" id="{40AACF60-9A69-4439-8BE0-2EEFC2739C8A}"/>
+                <a16:creationId xmlns:a16="http://schemas.microsoft.com/office/drawing/2014/main" id="{40AACF60-9A69-4439-8BE0-2EEFC2739C8A}"/>
               </a:ext>
             </a:extLst>
           </p:cNvPr>
@@ -8575,14 +8575,13 @@
               <a:defRPr/>
             </a:pPr>
             <a:r>
-              <a:rPr lang="bg-BG" dirty="0" smtClean="0"/>
+              <a:rPr lang="bg-BG" dirty="0"/>
               <a:t>Въпроси</a:t>
             </a:r>
             <a:r>
               <a:rPr lang="en-US" dirty="0"/>
               <a:t>?</a:t>
             </a:r>
-            <a:endParaRPr lang="en-US" dirty="0"/>
           </a:p>
         </p:txBody>
       </p:sp>
@@ -8640,14 +8639,13 @@
               <a:defRPr/>
             </a:pPr>
             <a:r>
-              <a:rPr lang="bg-BG" dirty="0" smtClean="0"/>
+              <a:rPr lang="bg-BG" dirty="0"/>
               <a:t>Благодарим Ви за вниманието</a:t>
             </a:r>
             <a:r>
-              <a:rPr lang="en-US" dirty="0" smtClean="0"/>
+              <a:rPr lang="en-US" dirty="0"/>
               <a:t>!</a:t>
             </a:r>
-            <a:endParaRPr lang="en-US" dirty="0"/>
           </a:p>
         </p:txBody>
       </p:sp>
@@ -9135,7 +9133,7 @@
           <p:cNvPr id="2" name="Title 1">
             <a:extLst>
               <a:ext uri="{FF2B5EF4-FFF2-40B4-BE49-F238E27FC236}">
-                <a16:creationId xmlns:a16="http://schemas.microsoft.com/office/drawing/2014/main" xmlns="" id="{D817CA20-6D8D-4E97-8F68-7541BBBB0843}"/>
+                <a16:creationId xmlns:a16="http://schemas.microsoft.com/office/drawing/2014/main" id="{D817CA20-6D8D-4E97-8F68-7541BBBB0843}"/>
               </a:ext>
             </a:extLst>
           </p:cNvPr>
@@ -9171,7 +9169,7 @@
           <p:cNvPr id="3" name="Content Placeholder 2">
             <a:extLst>
               <a:ext uri="{FF2B5EF4-FFF2-40B4-BE49-F238E27FC236}">
-                <a16:creationId xmlns:a16="http://schemas.microsoft.com/office/drawing/2014/main" xmlns="" id="{D8782128-38B8-4377-9186-9B3C8E79FF22}"/>
+                <a16:creationId xmlns:a16="http://schemas.microsoft.com/office/drawing/2014/main" id="{D8782128-38B8-4377-9186-9B3C8E79FF22}"/>
               </a:ext>
             </a:extLst>
           </p:cNvPr>
@@ -9411,7 +9409,7 @@
           <p:cNvPr id="2" name="Title 1">
             <a:extLst>
               <a:ext uri="{FF2B5EF4-FFF2-40B4-BE49-F238E27FC236}">
-                <a16:creationId xmlns:a16="http://schemas.microsoft.com/office/drawing/2014/main" xmlns="" id="{192491ED-F352-4502-9DE0-9459E549294A}"/>
+                <a16:creationId xmlns:a16="http://schemas.microsoft.com/office/drawing/2014/main" id="{192491ED-F352-4502-9DE0-9459E549294A}"/>
               </a:ext>
             </a:extLst>
           </p:cNvPr>
@@ -9447,7 +9445,7 @@
           <p:cNvPr id="3" name="Content Placeholder 2">
             <a:extLst>
               <a:ext uri="{FF2B5EF4-FFF2-40B4-BE49-F238E27FC236}">
-                <a16:creationId xmlns:a16="http://schemas.microsoft.com/office/drawing/2014/main" xmlns="" id="{A728B3F8-3A48-4649-9CD0-307FA59A700F}"/>
+                <a16:creationId xmlns:a16="http://schemas.microsoft.com/office/drawing/2014/main" id="{A728B3F8-3A48-4649-9CD0-307FA59A700F}"/>
               </a:ext>
             </a:extLst>
           </p:cNvPr>

</xml_diff>